<commit_message>
Revised a gap in overview charts (fixed by Dimitar Dimitrov).
</commit_message>
<xml_diff>
--- a/meetings/2012-08-13/meeting-3.pptx
+++ b/meetings/2012-08-13/meeting-3.pptx
@@ -2834,37 +2834,37 @@
     </dgm:pt>
   </dgm:ptLst>
   <dgm:cxnLst>
+    <dgm:cxn modelId="{46F0BA38-88E7-45C3-8F70-1D9944C00404}" type="presOf" srcId="{DD23B39D-3ECD-4D2F-9B4B-6A52C40BCD84}" destId="{372BC235-BB41-49BC-A658-BA2634AC7419}" srcOrd="0" destOrd="0" presId="urn:microsoft.com/office/officeart/2005/8/layout/hProcess7"/>
+    <dgm:cxn modelId="{9DED8F87-9943-4041-8682-E14BF8D9D1CC}" srcId="{E1924666-3568-4CED-8581-2F45BEDA6E25}" destId="{7F2BC32B-66F6-497B-B631-4417B4739CC7}" srcOrd="0" destOrd="0" parTransId="{01F8B5FC-6491-4DE7-A7A0-DDA2C6D16890}" sibTransId="{4B404C88-7E6A-463E-A4EE-62FA0B6E892F}"/>
+    <dgm:cxn modelId="{9B67BE64-01B5-476F-B987-E30A17AFAC0D}" srcId="{0640DC34-DDC1-4327-B907-0CA483128294}" destId="{DD23B39D-3ECD-4D2F-9B4B-6A52C40BCD84}" srcOrd="5" destOrd="0" parTransId="{B58EA819-1DD8-4A75-AAF0-8AD39625F75B}" sibTransId="{EBEC2D4A-8764-424C-BE68-F5E5CD964A2E}"/>
+    <dgm:cxn modelId="{4E8EFAB4-B4CD-463E-A93A-EF605E137BDC}" srcId="{0640DC34-DDC1-4327-B907-0CA483128294}" destId="{11541557-E03D-4AE2-AA90-2147B57BCB1B}" srcOrd="1" destOrd="0" parTransId="{B9BBF94F-65F0-4B5A-93B0-139416557B8A}" sibTransId="{02B698E4-058C-4841-9913-8B449C158AF5}"/>
+    <dgm:cxn modelId="{6327B37F-D368-4B2A-AF79-E2E5076B0A8B}" type="presOf" srcId="{11541557-E03D-4AE2-AA90-2147B57BCB1B}" destId="{D08100B6-384D-490A-85BA-7F7F31DE98D1}" srcOrd="0" destOrd="0" presId="urn:microsoft.com/office/officeart/2005/8/layout/hProcess7"/>
+    <dgm:cxn modelId="{61F1D512-561E-48CB-80DB-EC91EFCFA1A4}" type="presOf" srcId="{4CA5DD1D-0060-4659-AF25-05CCA8BCDFC2}" destId="{ABA90803-96FE-4597-A57B-9EECA2DFCEA2}" srcOrd="0" destOrd="0" presId="urn:microsoft.com/office/officeart/2005/8/layout/hProcess7"/>
+    <dgm:cxn modelId="{ADABAECD-871D-4185-9A74-5A702D15E953}" type="presOf" srcId="{0640DC34-DDC1-4327-B907-0CA483128294}" destId="{6C43603B-7D0E-444D-91CE-794D3EFF7EA5}" srcOrd="0" destOrd="0" presId="urn:microsoft.com/office/officeart/2005/8/layout/hProcess7"/>
+    <dgm:cxn modelId="{BDAB6FB5-D624-4860-A6B0-894558EA5A77}" srcId="{0640DC34-DDC1-4327-B907-0CA483128294}" destId="{3BFC92A5-4207-4E8B-8E1B-B9F544D0EAC2}" srcOrd="2" destOrd="0" parTransId="{31E8C51A-2C87-42F5-8DC1-826CFCA047D6}" sibTransId="{F235E436-B178-497B-A2F1-39A63ABA3005}"/>
+    <dgm:cxn modelId="{C935F384-EF29-4C92-926F-EAE5F1E8E23C}" type="presOf" srcId="{3BFC92A5-4207-4E8B-8E1B-B9F544D0EAC2}" destId="{CB5983A8-A988-4127-839A-2C6255E1574F}" srcOrd="1" destOrd="0" presId="urn:microsoft.com/office/officeart/2005/8/layout/hProcess7"/>
+    <dgm:cxn modelId="{75577A95-57F1-44F5-9C04-67E21C3853C7}" type="presOf" srcId="{51C27C51-D4DC-4533-8C69-A4B7A2F3717A}" destId="{30EBF52A-F479-4DB1-8D61-C247CCD8C1D2}" srcOrd="1" destOrd="0" presId="urn:microsoft.com/office/officeart/2005/8/layout/hProcess7"/>
+    <dgm:cxn modelId="{68084407-19B8-4C2C-9106-9D8761F22DB1}" type="presOf" srcId="{3BFC92A5-4207-4E8B-8E1B-B9F544D0EAC2}" destId="{123DF074-D1C9-4DB3-93D1-F996317711A2}" srcOrd="0" destOrd="0" presId="urn:microsoft.com/office/officeart/2005/8/layout/hProcess7"/>
+    <dgm:cxn modelId="{F3997F11-C316-4FE4-8235-826843CCEB75}" type="presOf" srcId="{E1924666-3568-4CED-8581-2F45BEDA6E25}" destId="{623D8964-7034-4ACD-AE47-9A2FDA43B5BB}" srcOrd="0" destOrd="0" presId="urn:microsoft.com/office/officeart/2005/8/layout/hProcess7"/>
+    <dgm:cxn modelId="{C99C0EBC-7340-43FA-BC9A-02DA0F6C7075}" srcId="{0640DC34-DDC1-4327-B907-0CA483128294}" destId="{E1924666-3568-4CED-8581-2F45BEDA6E25}" srcOrd="3" destOrd="0" parTransId="{56FAB554-933A-43BF-BCAE-C40F5E46FBEA}" sibTransId="{1FCD4710-BCAD-413D-95F2-7A3E945B9E1A}"/>
     <dgm:cxn modelId="{0E122428-5056-46D5-BA95-6DE0CBDCEE7D}" srcId="{DD1C07C0-1541-4A1A-BB8C-C6EA4941FE86}" destId="{4CA5DD1D-0060-4659-AF25-05CCA8BCDFC2}" srcOrd="0" destOrd="0" parTransId="{274FC33C-2CAA-41D4-8E40-06D46D69D5A5}" sibTransId="{712C7627-40E1-4584-B626-ADF7C4B27EEF}"/>
-    <dgm:cxn modelId="{C935F384-EF29-4C92-926F-EAE5F1E8E23C}" type="presOf" srcId="{3BFC92A5-4207-4E8B-8E1B-B9F544D0EAC2}" destId="{CB5983A8-A988-4127-839A-2C6255E1574F}" srcOrd="1" destOrd="0" presId="urn:microsoft.com/office/officeart/2005/8/layout/hProcess7"/>
+    <dgm:cxn modelId="{22286825-FDBB-411D-8657-2135496D972A}" type="presOf" srcId="{DD1C07C0-1541-4A1A-BB8C-C6EA4941FE86}" destId="{B667C495-F577-4248-B8F6-464FBFCC2A82}" srcOrd="1" destOrd="0" presId="urn:microsoft.com/office/officeart/2005/8/layout/hProcess7"/>
+    <dgm:cxn modelId="{AEDE79E1-6E11-4B4A-A24B-E41306115D35}" type="presOf" srcId="{7F2BC32B-66F6-497B-B631-4417B4739CC7}" destId="{170144A1-F6B8-44B9-B4B3-C927D7C7FA7E}" srcOrd="0" destOrd="0" presId="urn:microsoft.com/office/officeart/2005/8/layout/hProcess7"/>
+    <dgm:cxn modelId="{A72ED095-589A-420D-8F5A-56961DC95148}" srcId="{DD23B39D-3ECD-4D2F-9B4B-6A52C40BCD84}" destId="{0ED3C4BD-45AD-42F9-AADF-A7DF2B049376}" srcOrd="0" destOrd="0" parTransId="{0116460D-1B69-446B-9472-18E4F6814F48}" sibTransId="{BAF2C4DB-CB58-4AC5-BF26-E4366FDCE766}"/>
+    <dgm:cxn modelId="{E92CBFD2-9DEB-4796-94B8-F3DC891651F2}" type="presOf" srcId="{0ED3C4BD-45AD-42F9-AADF-A7DF2B049376}" destId="{73F9FBCE-F2BA-48E6-A20C-68B260B0CFD9}" srcOrd="0" destOrd="0" presId="urn:microsoft.com/office/officeart/2005/8/layout/hProcess7"/>
     <dgm:cxn modelId="{C716F2A3-EB37-4938-AE9F-ABF4ACA5BCBD}" type="presOf" srcId="{ADF7B13D-DC04-4093-B2E2-DB80DD415382}" destId="{34AD7D33-EFA6-476D-B9F7-9C42818A2646}" srcOrd="0" destOrd="0" presId="urn:microsoft.com/office/officeart/2005/8/layout/hProcess7"/>
-    <dgm:cxn modelId="{AEDE79E1-6E11-4B4A-A24B-E41306115D35}" type="presOf" srcId="{7F2BC32B-66F6-497B-B631-4417B4739CC7}" destId="{170144A1-F6B8-44B9-B4B3-C927D7C7FA7E}" srcOrd="0" destOrd="0" presId="urn:microsoft.com/office/officeart/2005/8/layout/hProcess7"/>
+    <dgm:cxn modelId="{638E4056-BD18-42E2-9AAE-0EB4DC520800}" type="presOf" srcId="{04BC14AD-DCF1-4468-8F69-693A7CF858FE}" destId="{1685F790-04FF-4B4A-AB13-273EE57D65DF}" srcOrd="0" destOrd="0" presId="urn:microsoft.com/office/officeart/2005/8/layout/hProcess7"/>
+    <dgm:cxn modelId="{CD7F4C47-37DD-4456-BFC2-B83CF714689A}" srcId="{0640DC34-DDC1-4327-B907-0CA483128294}" destId="{51C27C51-D4DC-4533-8C69-A4B7A2F3717A}" srcOrd="4" destOrd="0" parTransId="{E09CEF8F-BE88-4193-A430-CB887DFBB096}" sibTransId="{9AF29266-641D-47FF-89D0-6C2C98A81DB0}"/>
+    <dgm:cxn modelId="{B2AEC5AC-740A-44FB-BBD2-5D703066F240}" type="presOf" srcId="{11541557-E03D-4AE2-AA90-2147B57BCB1B}" destId="{757622C1-7471-4A43-9DA5-70A4AF77CDDF}" srcOrd="1" destOrd="0" presId="urn:microsoft.com/office/officeart/2005/8/layout/hProcess7"/>
+    <dgm:cxn modelId="{C464B83A-73A9-4DDA-B7D3-4ABD55BB6DC5}" type="presOf" srcId="{51C27C51-D4DC-4533-8C69-A4B7A2F3717A}" destId="{8CCD22DA-1596-43E8-9230-0BDDDB40E655}" srcOrd="0" destOrd="0" presId="urn:microsoft.com/office/officeart/2005/8/layout/hProcess7"/>
+    <dgm:cxn modelId="{1AF787FE-CF5A-4261-A932-E84B7D5AF000}" type="presOf" srcId="{EA7267B0-0334-4945-8C37-707CF4D4F61C}" destId="{060FDE11-A0B5-480E-993C-A9F30DF021D5}" srcOrd="0" destOrd="0" presId="urn:microsoft.com/office/officeart/2005/8/layout/hProcess7"/>
+    <dgm:cxn modelId="{7A685FC6-2717-4E95-8BAF-A3DD68CCBA79}" srcId="{11541557-E03D-4AE2-AA90-2147B57BCB1B}" destId="{EA7267B0-0334-4945-8C37-707CF4D4F61C}" srcOrd="0" destOrd="0" parTransId="{6B8D2465-EAD5-4B94-853E-52572D429FA5}" sibTransId="{EBB04A12-15CF-4D18-B971-5DB2F0522F37}"/>
+    <dgm:cxn modelId="{B939D004-60B3-438C-B034-120C24A02895}" srcId="{0640DC34-DDC1-4327-B907-0CA483128294}" destId="{DD1C07C0-1541-4A1A-BB8C-C6EA4941FE86}" srcOrd="0" destOrd="0" parTransId="{09EC4005-4575-413B-A727-322F982EB0A3}" sibTransId="{4465DF4E-57FB-49FC-9A7E-D5B29FEC4D15}"/>
+    <dgm:cxn modelId="{ECC8D020-65A7-492C-A1A7-045B05F7E706}" type="presOf" srcId="{DD23B39D-3ECD-4D2F-9B4B-6A52C40BCD84}" destId="{5D41070C-BEC3-4EC0-B9A7-0A78F498E077}" srcOrd="1" destOrd="0" presId="urn:microsoft.com/office/officeart/2005/8/layout/hProcess7"/>
     <dgm:cxn modelId="{C7A842B3-3228-46BB-AD7F-9E0A7842154C}" srcId="{51C27C51-D4DC-4533-8C69-A4B7A2F3717A}" destId="{ADF7B13D-DC04-4093-B2E2-DB80DD415382}" srcOrd="0" destOrd="0" parTransId="{D0E3097B-9B7D-4EC4-B3A1-22DE2FB53CFD}" sibTransId="{FC5B091A-0550-4987-91D1-220E541AC53A}"/>
-    <dgm:cxn modelId="{A72ED095-589A-420D-8F5A-56961DC95148}" srcId="{DD23B39D-3ECD-4D2F-9B4B-6A52C40BCD84}" destId="{0ED3C4BD-45AD-42F9-AADF-A7DF2B049376}" srcOrd="0" destOrd="0" parTransId="{0116460D-1B69-446B-9472-18E4F6814F48}" sibTransId="{BAF2C4DB-CB58-4AC5-BF26-E4366FDCE766}"/>
-    <dgm:cxn modelId="{BDAB6FB5-D624-4860-A6B0-894558EA5A77}" srcId="{0640DC34-DDC1-4327-B907-0CA483128294}" destId="{3BFC92A5-4207-4E8B-8E1B-B9F544D0EAC2}" srcOrd="2" destOrd="0" parTransId="{31E8C51A-2C87-42F5-8DC1-826CFCA047D6}" sibTransId="{F235E436-B178-497B-A2F1-39A63ABA3005}"/>
-    <dgm:cxn modelId="{1AF787FE-CF5A-4261-A932-E84B7D5AF000}" type="presOf" srcId="{EA7267B0-0334-4945-8C37-707CF4D4F61C}" destId="{060FDE11-A0B5-480E-993C-A9F30DF021D5}" srcOrd="0" destOrd="0" presId="urn:microsoft.com/office/officeart/2005/8/layout/hProcess7"/>
-    <dgm:cxn modelId="{6327B37F-D368-4B2A-AF79-E2E5076B0A8B}" type="presOf" srcId="{11541557-E03D-4AE2-AA90-2147B57BCB1B}" destId="{D08100B6-384D-490A-85BA-7F7F31DE98D1}" srcOrd="0" destOrd="0" presId="urn:microsoft.com/office/officeart/2005/8/layout/hProcess7"/>
-    <dgm:cxn modelId="{E92CBFD2-9DEB-4796-94B8-F3DC891651F2}" type="presOf" srcId="{0ED3C4BD-45AD-42F9-AADF-A7DF2B049376}" destId="{73F9FBCE-F2BA-48E6-A20C-68B260B0CFD9}" srcOrd="0" destOrd="0" presId="urn:microsoft.com/office/officeart/2005/8/layout/hProcess7"/>
-    <dgm:cxn modelId="{9DED8F87-9943-4041-8682-E14BF8D9D1CC}" srcId="{E1924666-3568-4CED-8581-2F45BEDA6E25}" destId="{7F2BC32B-66F6-497B-B631-4417B4739CC7}" srcOrd="0" destOrd="0" parTransId="{01F8B5FC-6491-4DE7-A7A0-DDA2C6D16890}" sibTransId="{4B404C88-7E6A-463E-A4EE-62FA0B6E892F}"/>
-    <dgm:cxn modelId="{ECC8D020-65A7-492C-A1A7-045B05F7E706}" type="presOf" srcId="{DD23B39D-3ECD-4D2F-9B4B-6A52C40BCD84}" destId="{5D41070C-BEC3-4EC0-B9A7-0A78F498E077}" srcOrd="1" destOrd="0" presId="urn:microsoft.com/office/officeart/2005/8/layout/hProcess7"/>
+    <dgm:cxn modelId="{332F1741-CA2B-44CA-8368-3A3B3A505C50}" type="presOf" srcId="{DD1C07C0-1541-4A1A-BB8C-C6EA4941FE86}" destId="{939D862D-E0F7-40E6-AB6A-51477B57711C}" srcOrd="0" destOrd="0" presId="urn:microsoft.com/office/officeart/2005/8/layout/hProcess7"/>
+    <dgm:cxn modelId="{8FF33A6E-0141-4411-A39E-8D13503B4F7C}" type="presOf" srcId="{E1924666-3568-4CED-8581-2F45BEDA6E25}" destId="{A017D63D-2C93-4177-866B-A3671AE95EBD}" srcOrd="1" destOrd="0" presId="urn:microsoft.com/office/officeart/2005/8/layout/hProcess7"/>
     <dgm:cxn modelId="{74C657E9-E2A0-42AB-A035-73FCD16C6831}" srcId="{3BFC92A5-4207-4E8B-8E1B-B9F544D0EAC2}" destId="{04BC14AD-DCF1-4468-8F69-693A7CF858FE}" srcOrd="0" destOrd="0" parTransId="{A908645F-2DF7-4D05-9AF0-56296046BB9E}" sibTransId="{001B8561-F7A2-47BD-9E9C-1A6EE2D34028}"/>
-    <dgm:cxn modelId="{F3997F11-C316-4FE4-8235-826843CCEB75}" type="presOf" srcId="{E1924666-3568-4CED-8581-2F45BEDA6E25}" destId="{623D8964-7034-4ACD-AE47-9A2FDA43B5BB}" srcOrd="0" destOrd="0" presId="urn:microsoft.com/office/officeart/2005/8/layout/hProcess7"/>
-    <dgm:cxn modelId="{9B67BE64-01B5-476F-B987-E30A17AFAC0D}" srcId="{0640DC34-DDC1-4327-B907-0CA483128294}" destId="{DD23B39D-3ECD-4D2F-9B4B-6A52C40BCD84}" srcOrd="5" destOrd="0" parTransId="{B58EA819-1DD8-4A75-AAF0-8AD39625F75B}" sibTransId="{EBEC2D4A-8764-424C-BE68-F5E5CD964A2E}"/>
-    <dgm:cxn modelId="{68084407-19B8-4C2C-9106-9D8761F22DB1}" type="presOf" srcId="{3BFC92A5-4207-4E8B-8E1B-B9F544D0EAC2}" destId="{123DF074-D1C9-4DB3-93D1-F996317711A2}" srcOrd="0" destOrd="0" presId="urn:microsoft.com/office/officeart/2005/8/layout/hProcess7"/>
-    <dgm:cxn modelId="{332F1741-CA2B-44CA-8368-3A3B3A505C50}" type="presOf" srcId="{DD1C07C0-1541-4A1A-BB8C-C6EA4941FE86}" destId="{939D862D-E0F7-40E6-AB6A-51477B57711C}" srcOrd="0" destOrd="0" presId="urn:microsoft.com/office/officeart/2005/8/layout/hProcess7"/>
-    <dgm:cxn modelId="{B939D004-60B3-438C-B034-120C24A02895}" srcId="{0640DC34-DDC1-4327-B907-0CA483128294}" destId="{DD1C07C0-1541-4A1A-BB8C-C6EA4941FE86}" srcOrd="0" destOrd="0" parTransId="{09EC4005-4575-413B-A727-322F982EB0A3}" sibTransId="{4465DF4E-57FB-49FC-9A7E-D5B29FEC4D15}"/>
-    <dgm:cxn modelId="{ADABAECD-871D-4185-9A74-5A702D15E953}" type="presOf" srcId="{0640DC34-DDC1-4327-B907-0CA483128294}" destId="{6C43603B-7D0E-444D-91CE-794D3EFF7EA5}" srcOrd="0" destOrd="0" presId="urn:microsoft.com/office/officeart/2005/8/layout/hProcess7"/>
-    <dgm:cxn modelId="{CD7F4C47-37DD-4456-BFC2-B83CF714689A}" srcId="{0640DC34-DDC1-4327-B907-0CA483128294}" destId="{51C27C51-D4DC-4533-8C69-A4B7A2F3717A}" srcOrd="4" destOrd="0" parTransId="{E09CEF8F-BE88-4193-A430-CB887DFBB096}" sibTransId="{9AF29266-641D-47FF-89D0-6C2C98A81DB0}"/>
-    <dgm:cxn modelId="{22286825-FDBB-411D-8657-2135496D972A}" type="presOf" srcId="{DD1C07C0-1541-4A1A-BB8C-C6EA4941FE86}" destId="{B667C495-F577-4248-B8F6-464FBFCC2A82}" srcOrd="1" destOrd="0" presId="urn:microsoft.com/office/officeart/2005/8/layout/hProcess7"/>
-    <dgm:cxn modelId="{638E4056-BD18-42E2-9AAE-0EB4DC520800}" type="presOf" srcId="{04BC14AD-DCF1-4468-8F69-693A7CF858FE}" destId="{1685F790-04FF-4B4A-AB13-273EE57D65DF}" srcOrd="0" destOrd="0" presId="urn:microsoft.com/office/officeart/2005/8/layout/hProcess7"/>
-    <dgm:cxn modelId="{75577A95-57F1-44F5-9C04-67E21C3853C7}" type="presOf" srcId="{51C27C51-D4DC-4533-8C69-A4B7A2F3717A}" destId="{30EBF52A-F479-4DB1-8D61-C247CCD8C1D2}" srcOrd="1" destOrd="0" presId="urn:microsoft.com/office/officeart/2005/8/layout/hProcess7"/>
-    <dgm:cxn modelId="{B2AEC5AC-740A-44FB-BBD2-5D703066F240}" type="presOf" srcId="{11541557-E03D-4AE2-AA90-2147B57BCB1B}" destId="{757622C1-7471-4A43-9DA5-70A4AF77CDDF}" srcOrd="1" destOrd="0" presId="urn:microsoft.com/office/officeart/2005/8/layout/hProcess7"/>
-    <dgm:cxn modelId="{8FF33A6E-0141-4411-A39E-8D13503B4F7C}" type="presOf" srcId="{E1924666-3568-4CED-8581-2F45BEDA6E25}" destId="{A017D63D-2C93-4177-866B-A3671AE95EBD}" srcOrd="1" destOrd="0" presId="urn:microsoft.com/office/officeart/2005/8/layout/hProcess7"/>
-    <dgm:cxn modelId="{C99C0EBC-7340-43FA-BC9A-02DA0F6C7075}" srcId="{0640DC34-DDC1-4327-B907-0CA483128294}" destId="{E1924666-3568-4CED-8581-2F45BEDA6E25}" srcOrd="3" destOrd="0" parTransId="{56FAB554-933A-43BF-BCAE-C40F5E46FBEA}" sibTransId="{1FCD4710-BCAD-413D-95F2-7A3E945B9E1A}"/>
-    <dgm:cxn modelId="{61F1D512-561E-48CB-80DB-EC91EFCFA1A4}" type="presOf" srcId="{4CA5DD1D-0060-4659-AF25-05CCA8BCDFC2}" destId="{ABA90803-96FE-4597-A57B-9EECA2DFCEA2}" srcOrd="0" destOrd="0" presId="urn:microsoft.com/office/officeart/2005/8/layout/hProcess7"/>
-    <dgm:cxn modelId="{7A685FC6-2717-4E95-8BAF-A3DD68CCBA79}" srcId="{11541557-E03D-4AE2-AA90-2147B57BCB1B}" destId="{EA7267B0-0334-4945-8C37-707CF4D4F61C}" srcOrd="0" destOrd="0" parTransId="{6B8D2465-EAD5-4B94-853E-52572D429FA5}" sibTransId="{EBB04A12-15CF-4D18-B971-5DB2F0522F37}"/>
-    <dgm:cxn modelId="{4E8EFAB4-B4CD-463E-A93A-EF605E137BDC}" srcId="{0640DC34-DDC1-4327-B907-0CA483128294}" destId="{11541557-E03D-4AE2-AA90-2147B57BCB1B}" srcOrd="1" destOrd="0" parTransId="{B9BBF94F-65F0-4B5A-93B0-139416557B8A}" sibTransId="{02B698E4-058C-4841-9913-8B449C158AF5}"/>
-    <dgm:cxn modelId="{46F0BA38-88E7-45C3-8F70-1D9944C00404}" type="presOf" srcId="{DD23B39D-3ECD-4D2F-9B4B-6A52C40BCD84}" destId="{372BC235-BB41-49BC-A658-BA2634AC7419}" srcOrd="0" destOrd="0" presId="urn:microsoft.com/office/officeart/2005/8/layout/hProcess7"/>
-    <dgm:cxn modelId="{C464B83A-73A9-4DDA-B7D3-4ABD55BB6DC5}" type="presOf" srcId="{51C27C51-D4DC-4533-8C69-A4B7A2F3717A}" destId="{8CCD22DA-1596-43E8-9230-0BDDDB40E655}" srcOrd="0" destOrd="0" presId="urn:microsoft.com/office/officeart/2005/8/layout/hProcess7"/>
     <dgm:cxn modelId="{E04A0E5E-5615-46CA-8A55-9105339E0469}" type="presParOf" srcId="{6C43603B-7D0E-444D-91CE-794D3EFF7EA5}" destId="{682EAFB9-05E3-4CC6-9EFB-50A19B695108}" srcOrd="0" destOrd="0" presId="urn:microsoft.com/office/officeart/2005/8/layout/hProcess7"/>
     <dgm:cxn modelId="{E32D17DD-7943-47B9-B839-CA142F9755D5}" type="presParOf" srcId="{682EAFB9-05E3-4CC6-9EFB-50A19B695108}" destId="{939D862D-E0F7-40E6-AB6A-51477B57711C}" srcOrd="0" destOrd="0" presId="urn:microsoft.com/office/officeart/2005/8/layout/hProcess7"/>
     <dgm:cxn modelId="{27771A28-4BB2-4EEF-B6B1-E54D512DA1E8}" type="presParOf" srcId="{682EAFB9-05E3-4CC6-9EFB-50A19B695108}" destId="{B667C495-F577-4248-B8F6-464FBFCC2A82}" srcOrd="1" destOrd="0" presId="urn:microsoft.com/office/officeart/2005/8/layout/hProcess7"/>
@@ -3306,1158 +3306,6 @@
       <dsp:cNvGrpSpPr/>
     </dsp:nvGrpSpPr>
     <dsp:grpSpPr/>
-    <dsp:sp modelId="{939D862D-E0F7-40E6-AB6A-51477B57711C}">
-      <dsp:nvSpPr>
-        <dsp:cNvPr id="0" name=""/>
-        <dsp:cNvSpPr/>
-      </dsp:nvSpPr>
-      <dsp:spPr>
-        <a:xfrm>
-          <a:off x="2913" y="88"/>
-          <a:ext cx="1637935" cy="1303671"/>
-        </a:xfrm>
-        <a:prstGeom prst="roundRect">
-          <a:avLst>
-            <a:gd name="adj" fmla="val 5000"/>
-          </a:avLst>
-        </a:prstGeom>
-        <a:solidFill>
-          <a:schemeClr val="accent1">
-            <a:hueOff val="0"/>
-            <a:satOff val="0"/>
-            <a:lumOff val="0"/>
-            <a:alphaOff val="0"/>
-          </a:schemeClr>
-        </a:solidFill>
-        <a:ln w="25400" cap="flat" cmpd="sng" algn="ctr">
-          <a:solidFill>
-            <a:schemeClr val="lt1">
-              <a:hueOff val="0"/>
-              <a:satOff val="0"/>
-              <a:lumOff val="0"/>
-              <a:alphaOff val="0"/>
-            </a:schemeClr>
-          </a:solidFill>
-          <a:prstDash val="solid"/>
-        </a:ln>
-        <a:effectLst/>
-        <a:scene3d>
-          <a:camera prst="orthographicFront"/>
-          <a:lightRig rig="threePt" dir="t"/>
-        </a:scene3d>
-        <a:sp3d>
-          <a:bevelT/>
-        </a:sp3d>
-      </dsp:spPr>
-      <dsp:style>
-        <a:lnRef idx="2">
-          <a:scrgbClr r="0" g="0" b="0"/>
-        </a:lnRef>
-        <a:fillRef idx="1">
-          <a:scrgbClr r="0" g="0" b="0"/>
-        </a:fillRef>
-        <a:effectRef idx="0">
-          <a:scrgbClr r="0" g="0" b="0"/>
-        </a:effectRef>
-        <a:fontRef idx="minor">
-          <a:schemeClr val="lt1"/>
-        </a:fontRef>
-      </dsp:style>
-      <dsp:txBody>
-        <a:bodyPr spcFirstLastPara="0" vert="horz" wrap="square" lIns="0" tIns="61722" rIns="80010" bIns="0" numCol="1" spcCol="1270" anchor="t" anchorCtr="0">
-          <a:noAutofit/>
-        </a:bodyPr>
-        <a:lstStyle/>
-        <a:p>
-          <a:pPr lvl="0" algn="r" defTabSz="800100">
-            <a:lnSpc>
-              <a:spcPct val="90000"/>
-            </a:lnSpc>
-            <a:spcBef>
-              <a:spcPct val="0"/>
-            </a:spcBef>
-            <a:spcAft>
-              <a:spcPct val="35000"/>
-            </a:spcAft>
-          </a:pPr>
-          <a:r>
-            <a:rPr lang="bg-BG" sz="1800" kern="1200" dirty="0" smtClean="0"/>
-            <a:t> </a:t>
-          </a:r>
-          <a:endParaRPr lang="en-GB" sz="1800" kern="1200" dirty="0"/>
-        </a:p>
-      </dsp:txBody>
-      <dsp:txXfrm rot="16200000">
-        <a:off x="-367798" y="370800"/>
-        <a:ext cx="1069010" cy="327587"/>
-      </dsp:txXfrm>
-    </dsp:sp>
-    <dsp:sp modelId="{ABA90803-96FE-4597-A57B-9EECA2DFCEA2}">
-      <dsp:nvSpPr>
-        <dsp:cNvPr id="0" name=""/>
-        <dsp:cNvSpPr/>
-      </dsp:nvSpPr>
-      <dsp:spPr>
-        <a:xfrm>
-          <a:off x="330500" y="88"/>
-          <a:ext cx="1220262" cy="1303671"/>
-        </a:xfrm>
-        <a:prstGeom prst="rect">
-          <a:avLst/>
-        </a:prstGeom>
-        <a:noFill/>
-        <a:ln w="25400" cap="flat" cmpd="sng" algn="ctr">
-          <a:noFill/>
-          <a:prstDash val="solid"/>
-        </a:ln>
-        <a:effectLst/>
-        <a:scene3d>
-          <a:camera prst="orthographicFront"/>
-          <a:lightRig rig="threePt" dir="t"/>
-        </a:scene3d>
-        <a:sp3d/>
-      </dsp:spPr>
-      <dsp:style>
-        <a:lnRef idx="2">
-          <a:scrgbClr r="0" g="0" b="0"/>
-        </a:lnRef>
-        <a:fillRef idx="1">
-          <a:scrgbClr r="0" g="0" b="0"/>
-        </a:fillRef>
-        <a:effectRef idx="0">
-          <a:scrgbClr r="0" g="0" b="0"/>
-        </a:effectRef>
-        <a:fontRef idx="minor">
-          <a:schemeClr val="lt1"/>
-        </a:fontRef>
-      </dsp:style>
-      <dsp:txBody>
-        <a:bodyPr spcFirstLastPara="0" vert="horz" wrap="square" lIns="0" tIns="68580" rIns="0" bIns="0" numCol="1" spcCol="1270" anchor="ctr" anchorCtr="0">
-          <a:noAutofit/>
-        </a:bodyPr>
-        <a:lstStyle/>
-        <a:p>
-          <a:pPr lvl="0" algn="ctr" defTabSz="889000">
-            <a:lnSpc>
-              <a:spcPct val="90000"/>
-            </a:lnSpc>
-            <a:spcBef>
-              <a:spcPct val="0"/>
-            </a:spcBef>
-            <a:spcAft>
-              <a:spcPct val="35000"/>
-            </a:spcAft>
-          </a:pPr>
-          <a:r>
-            <a:rPr lang="bg-BG" sz="2000" kern="1200" dirty="0" smtClean="0"/>
-            <a:t>Планиране</a:t>
-          </a:r>
-          <a:br>
-            <a:rPr lang="bg-BG" sz="2000" kern="1200" dirty="0" smtClean="0"/>
-          </a:br>
-          <a:r>
-            <a:rPr lang="bg-BG" sz="2000" kern="1200" dirty="0" smtClean="0"/>
-            <a:t>и</a:t>
-          </a:r>
-          <a:br>
-            <a:rPr lang="bg-BG" sz="2000" kern="1200" dirty="0" smtClean="0"/>
-          </a:br>
-          <a:r>
-            <a:rPr lang="bg-BG" sz="2000" kern="1200" dirty="0" smtClean="0"/>
-            <a:t>писане </a:t>
-          </a:r>
-          <a:endParaRPr lang="en-GB" sz="2000" kern="1200" dirty="0"/>
-        </a:p>
-      </dsp:txBody>
-      <dsp:txXfrm>
-        <a:off x="330500" y="88"/>
-        <a:ext cx="1220262" cy="1303671"/>
-      </dsp:txXfrm>
-    </dsp:sp>
-    <dsp:sp modelId="{D08100B6-384D-490A-85BA-7F7F31DE98D1}">
-      <dsp:nvSpPr>
-        <dsp:cNvPr id="0" name=""/>
-        <dsp:cNvSpPr/>
-      </dsp:nvSpPr>
-      <dsp:spPr>
-        <a:xfrm>
-          <a:off x="1683992" y="88"/>
-          <a:ext cx="900995" cy="1303671"/>
-        </a:xfrm>
-        <a:prstGeom prst="roundRect">
-          <a:avLst>
-            <a:gd name="adj" fmla="val 5000"/>
-          </a:avLst>
-        </a:prstGeom>
-        <a:solidFill>
-          <a:schemeClr val="accent3">
-            <a:lumMod val="75000"/>
-          </a:schemeClr>
-        </a:solidFill>
-        <a:ln w="25400" cap="flat" cmpd="sng" algn="ctr">
-          <a:solidFill>
-            <a:schemeClr val="lt1">
-              <a:hueOff val="0"/>
-              <a:satOff val="0"/>
-              <a:lumOff val="0"/>
-              <a:alphaOff val="0"/>
-            </a:schemeClr>
-          </a:solidFill>
-          <a:prstDash val="solid"/>
-        </a:ln>
-        <a:effectLst/>
-        <a:scene3d>
-          <a:camera prst="orthographicFront"/>
-          <a:lightRig rig="threePt" dir="t"/>
-        </a:scene3d>
-        <a:sp3d>
-          <a:bevelT/>
-        </a:sp3d>
-      </dsp:spPr>
-      <dsp:style>
-        <a:lnRef idx="2">
-          <a:scrgbClr r="0" g="0" b="0"/>
-        </a:lnRef>
-        <a:fillRef idx="1">
-          <a:scrgbClr r="0" g="0" b="0"/>
-        </a:fillRef>
-        <a:effectRef idx="0">
-          <a:scrgbClr r="0" g="0" b="0"/>
-        </a:effectRef>
-        <a:fontRef idx="minor">
-          <a:schemeClr val="lt1"/>
-        </a:fontRef>
-      </dsp:style>
-      <dsp:txBody>
-        <a:bodyPr spcFirstLastPara="0" vert="vert270" wrap="square" lIns="0" tIns="61722" rIns="80010" bIns="0" numCol="1" spcCol="1270" anchor="ctr" anchorCtr="0">
-          <a:noAutofit/>
-        </a:bodyPr>
-        <a:lstStyle/>
-        <a:p>
-          <a:pPr lvl="0" algn="ctr" defTabSz="800100">
-            <a:lnSpc>
-              <a:spcPct val="90000"/>
-            </a:lnSpc>
-            <a:spcBef>
-              <a:spcPct val="0"/>
-            </a:spcBef>
-            <a:spcAft>
-              <a:spcPct val="35000"/>
-            </a:spcAft>
-          </a:pPr>
-          <a:r>
-            <a:rPr lang="bg-BG" sz="1800" kern="1200" dirty="0" smtClean="0"/>
-            <a:t> </a:t>
-          </a:r>
-          <a:endParaRPr lang="en-GB" sz="1800" kern="1200" dirty="0"/>
-        </a:p>
-      </dsp:txBody>
-      <dsp:txXfrm rot="16200000">
-        <a:off x="1239586" y="444494"/>
-        <a:ext cx="1069010" cy="180199"/>
-      </dsp:txXfrm>
-    </dsp:sp>
-    <dsp:sp modelId="{C73D82C5-FC5D-491C-8827-683697780916}">
-      <dsp:nvSpPr>
-        <dsp:cNvPr id="0" name=""/>
-        <dsp:cNvSpPr/>
-      </dsp:nvSpPr>
-      <dsp:spPr>
-        <a:xfrm rot="5400000">
-          <a:off x="1585696" y="1285055"/>
-          <a:ext cx="241339" cy="245690"/>
-        </a:xfrm>
-        <a:prstGeom prst="flowChartExtract">
-          <a:avLst/>
-        </a:prstGeom>
-        <a:noFill/>
-        <a:ln w="25400" cap="flat" cmpd="sng" algn="ctr">
-          <a:noFill/>
-          <a:prstDash val="solid"/>
-        </a:ln>
-        <a:effectLst/>
-        <a:scene3d>
-          <a:camera prst="orthographicFront"/>
-          <a:lightRig rig="threePt" dir="t"/>
-        </a:scene3d>
-        <a:sp3d>
-          <a:bevelT/>
-        </a:sp3d>
-      </dsp:spPr>
-      <dsp:style>
-        <a:lnRef idx="2">
-          <a:scrgbClr r="0" g="0" b="0"/>
-        </a:lnRef>
-        <a:fillRef idx="1">
-          <a:scrgbClr r="0" g="0" b="0"/>
-        </a:fillRef>
-        <a:effectRef idx="0">
-          <a:scrgbClr r="0" g="0" b="0"/>
-        </a:effectRef>
-        <a:fontRef idx="minor"/>
-      </dsp:style>
-    </dsp:sp>
-    <dsp:sp modelId="{060FDE11-A0B5-480E-993C-A9F30DF021D5}">
-      <dsp:nvSpPr>
-        <dsp:cNvPr id="0" name=""/>
-        <dsp:cNvSpPr/>
-      </dsp:nvSpPr>
-      <dsp:spPr>
-        <a:xfrm>
-          <a:off x="1917619" y="88"/>
-          <a:ext cx="671241" cy="1303671"/>
-        </a:xfrm>
-        <a:prstGeom prst="rect">
-          <a:avLst/>
-        </a:prstGeom>
-        <a:noFill/>
-        <a:ln w="25400" cap="flat" cmpd="sng" algn="ctr">
-          <a:noFill/>
-          <a:prstDash val="solid"/>
-        </a:ln>
-        <a:effectLst/>
-        <a:scene3d>
-          <a:camera prst="orthographicFront"/>
-          <a:lightRig rig="threePt" dir="t"/>
-        </a:scene3d>
-        <a:sp3d/>
-      </dsp:spPr>
-      <dsp:style>
-        <a:lnRef idx="2">
-          <a:scrgbClr r="0" g="0" b="0"/>
-        </a:lnRef>
-        <a:fillRef idx="1">
-          <a:scrgbClr r="0" g="0" b="0"/>
-        </a:fillRef>
-        <a:effectRef idx="0">
-          <a:scrgbClr r="0" g="0" b="0"/>
-        </a:effectRef>
-        <a:fontRef idx="minor">
-          <a:schemeClr val="lt1"/>
-        </a:fontRef>
-      </dsp:style>
-      <dsp:txBody>
-        <a:bodyPr spcFirstLastPara="0" vert="vert270" wrap="square" lIns="0" tIns="61722" rIns="0" bIns="0" numCol="1" spcCol="1270" anchor="t" anchorCtr="0">
-          <a:noAutofit/>
-        </a:bodyPr>
-        <a:lstStyle/>
-        <a:p>
-          <a:pPr lvl="0" algn="ctr" defTabSz="800100">
-            <a:lnSpc>
-              <a:spcPct val="90000"/>
-            </a:lnSpc>
-            <a:spcBef>
-              <a:spcPct val="0"/>
-            </a:spcBef>
-            <a:spcAft>
-              <a:spcPct val="35000"/>
-            </a:spcAft>
-          </a:pPr>
-          <a:r>
-            <a:rPr lang="bg-BG" sz="1800" kern="1200" dirty="0" smtClean="0"/>
-            <a:t>Междинна проверка</a:t>
-          </a:r>
-          <a:endParaRPr lang="en-GB" sz="1800" kern="1200" dirty="0"/>
-        </a:p>
-      </dsp:txBody>
-      <dsp:txXfrm>
-        <a:off x="1917619" y="88"/>
-        <a:ext cx="671241" cy="1303671"/>
-      </dsp:txXfrm>
-    </dsp:sp>
-    <dsp:sp modelId="{123DF074-D1C9-4DB3-93D1-F996317711A2}">
-      <dsp:nvSpPr>
-        <dsp:cNvPr id="0" name=""/>
-        <dsp:cNvSpPr/>
-      </dsp:nvSpPr>
-      <dsp:spPr>
-        <a:xfrm>
-          <a:off x="2660373" y="88"/>
-          <a:ext cx="1637935" cy="1303671"/>
-        </a:xfrm>
-        <a:prstGeom prst="roundRect">
-          <a:avLst>
-            <a:gd name="adj" fmla="val 5000"/>
-          </a:avLst>
-        </a:prstGeom>
-        <a:solidFill>
-          <a:schemeClr val="accent1">
-            <a:hueOff val="0"/>
-            <a:satOff val="0"/>
-            <a:lumOff val="0"/>
-            <a:alphaOff val="0"/>
-          </a:schemeClr>
-        </a:solidFill>
-        <a:ln w="25400" cap="flat" cmpd="sng" algn="ctr">
-          <a:solidFill>
-            <a:schemeClr val="lt1">
-              <a:hueOff val="0"/>
-              <a:satOff val="0"/>
-              <a:lumOff val="0"/>
-              <a:alphaOff val="0"/>
-            </a:schemeClr>
-          </a:solidFill>
-          <a:prstDash val="solid"/>
-        </a:ln>
-        <a:effectLst/>
-        <a:scene3d>
-          <a:camera prst="orthographicFront"/>
-          <a:lightRig rig="threePt" dir="t"/>
-        </a:scene3d>
-        <a:sp3d>
-          <a:bevelT/>
-        </a:sp3d>
-      </dsp:spPr>
-      <dsp:style>
-        <a:lnRef idx="2">
-          <a:scrgbClr r="0" g="0" b="0"/>
-        </a:lnRef>
-        <a:fillRef idx="1">
-          <a:scrgbClr r="0" g="0" b="0"/>
-        </a:fillRef>
-        <a:effectRef idx="0">
-          <a:scrgbClr r="0" g="0" b="0"/>
-        </a:effectRef>
-        <a:fontRef idx="minor">
-          <a:schemeClr val="lt1"/>
-        </a:fontRef>
-      </dsp:style>
-      <dsp:txBody>
-        <a:bodyPr spcFirstLastPara="0" vert="horz" wrap="square" lIns="0" tIns="61722" rIns="80010" bIns="0" numCol="1" spcCol="1270" anchor="ctr" anchorCtr="0">
-          <a:noAutofit/>
-        </a:bodyPr>
-        <a:lstStyle/>
-        <a:p>
-          <a:pPr lvl="0" algn="r" defTabSz="800100">
-            <a:lnSpc>
-              <a:spcPct val="90000"/>
-            </a:lnSpc>
-            <a:spcBef>
-              <a:spcPct val="0"/>
-            </a:spcBef>
-            <a:spcAft>
-              <a:spcPct val="35000"/>
-            </a:spcAft>
-          </a:pPr>
-          <a:r>
-            <a:rPr lang="bg-BG" sz="1800" kern="1200" dirty="0" smtClean="0"/>
-            <a:t> </a:t>
-          </a:r>
-          <a:endParaRPr lang="en-GB" sz="1800" kern="1200" dirty="0"/>
-        </a:p>
-      </dsp:txBody>
-      <dsp:txXfrm rot="16200000">
-        <a:off x="2289661" y="370800"/>
-        <a:ext cx="1069010" cy="327587"/>
-      </dsp:txXfrm>
-    </dsp:sp>
-    <dsp:sp modelId="{8FD4A057-D69C-4996-BA52-5F42BEBA520E}">
-      <dsp:nvSpPr>
-        <dsp:cNvPr id="0" name=""/>
-        <dsp:cNvSpPr/>
-      </dsp:nvSpPr>
-      <dsp:spPr>
-        <a:xfrm rot="5400000">
-          <a:off x="2547893" y="1285055"/>
-          <a:ext cx="241339" cy="245690"/>
-        </a:xfrm>
-        <a:prstGeom prst="flowChartExtract">
-          <a:avLst/>
-        </a:prstGeom>
-        <a:solidFill>
-          <a:schemeClr val="lt1">
-            <a:hueOff val="0"/>
-            <a:satOff val="0"/>
-            <a:lumOff val="0"/>
-            <a:alphaOff val="0"/>
-          </a:schemeClr>
-        </a:solidFill>
-        <a:ln w="25400" cap="flat" cmpd="sng" algn="ctr">
-          <a:solidFill>
-            <a:schemeClr val="accent1">
-              <a:hueOff val="0"/>
-              <a:satOff val="0"/>
-              <a:lumOff val="0"/>
-              <a:alphaOff val="0"/>
-            </a:schemeClr>
-          </a:solidFill>
-          <a:prstDash val="solid"/>
-        </a:ln>
-        <a:effectLst>
-          <a:outerShdw blurRad="50800" dist="38100" dir="2700000" algn="tl" rotWithShape="0">
-            <a:prstClr val="black">
-              <a:alpha val="40000"/>
-            </a:prstClr>
-          </a:outerShdw>
-        </a:effectLst>
-        <a:scene3d>
-          <a:camera prst="orthographicFront"/>
-          <a:lightRig rig="threePt" dir="t"/>
-        </a:scene3d>
-        <a:sp3d>
-          <a:bevelT/>
-        </a:sp3d>
-      </dsp:spPr>
-      <dsp:style>
-        <a:lnRef idx="2">
-          <a:scrgbClr r="0" g="0" b="0"/>
-        </a:lnRef>
-        <a:fillRef idx="1">
-          <a:scrgbClr r="0" g="0" b="0"/>
-        </a:fillRef>
-        <a:effectRef idx="0">
-          <a:scrgbClr r="0" g="0" b="0"/>
-        </a:effectRef>
-        <a:fontRef idx="minor"/>
-      </dsp:style>
-    </dsp:sp>
-    <dsp:sp modelId="{1685F790-04FF-4B4A-AB13-273EE57D65DF}">
-      <dsp:nvSpPr>
-        <dsp:cNvPr id="0" name=""/>
-        <dsp:cNvSpPr/>
-      </dsp:nvSpPr>
-      <dsp:spPr>
-        <a:xfrm>
-          <a:off x="2987960" y="88"/>
-          <a:ext cx="1220262" cy="1303671"/>
-        </a:xfrm>
-        <a:prstGeom prst="rect">
-          <a:avLst/>
-        </a:prstGeom>
-        <a:noFill/>
-        <a:ln w="25400" cap="flat" cmpd="sng" algn="ctr">
-          <a:noFill/>
-          <a:prstDash val="solid"/>
-        </a:ln>
-        <a:effectLst/>
-        <a:scene3d>
-          <a:camera prst="orthographicFront"/>
-          <a:lightRig rig="threePt" dir="t"/>
-        </a:scene3d>
-        <a:sp3d/>
-      </dsp:spPr>
-      <dsp:style>
-        <a:lnRef idx="2">
-          <a:scrgbClr r="0" g="0" b="0"/>
-        </a:lnRef>
-        <a:fillRef idx="1">
-          <a:scrgbClr r="0" g="0" b="0"/>
-        </a:fillRef>
-        <a:effectRef idx="0">
-          <a:scrgbClr r="0" g="0" b="0"/>
-        </a:effectRef>
-        <a:fontRef idx="minor">
-          <a:schemeClr val="lt1"/>
-        </a:fontRef>
-      </dsp:style>
-      <dsp:txBody>
-        <a:bodyPr spcFirstLastPara="0" vert="horz" wrap="square" lIns="0" tIns="68580" rIns="0" bIns="0" numCol="1" spcCol="1270" anchor="ctr" anchorCtr="0">
-          <a:noAutofit/>
-        </a:bodyPr>
-        <a:lstStyle/>
-        <a:p>
-          <a:pPr lvl="0" algn="l" defTabSz="889000">
-            <a:lnSpc>
-              <a:spcPct val="90000"/>
-            </a:lnSpc>
-            <a:spcBef>
-              <a:spcPct val="0"/>
-            </a:spcBef>
-            <a:spcAft>
-              <a:spcPct val="35000"/>
-            </a:spcAft>
-          </a:pPr>
-          <a:r>
-            <a:rPr lang="bg-BG" sz="2000" kern="1200" dirty="0" smtClean="0"/>
-            <a:t>Писане</a:t>
-          </a:r>
-          <a:endParaRPr lang="en-GB" sz="2000" kern="1200" dirty="0"/>
-        </a:p>
-      </dsp:txBody>
-      <dsp:txXfrm>
-        <a:off x="2987960" y="88"/>
-        <a:ext cx="1220262" cy="1303671"/>
-      </dsp:txXfrm>
-    </dsp:sp>
-    <dsp:sp modelId="{623D8964-7034-4ACD-AE47-9A2FDA43B5BB}">
-      <dsp:nvSpPr>
-        <dsp:cNvPr id="0" name=""/>
-        <dsp:cNvSpPr/>
-      </dsp:nvSpPr>
-      <dsp:spPr>
-        <a:xfrm>
-          <a:off x="4341452" y="88"/>
-          <a:ext cx="900995" cy="1303671"/>
-        </a:xfrm>
-        <a:prstGeom prst="roundRect">
-          <a:avLst>
-            <a:gd name="adj" fmla="val 5000"/>
-          </a:avLst>
-        </a:prstGeom>
-        <a:solidFill>
-          <a:schemeClr val="accent3">
-            <a:lumMod val="75000"/>
-          </a:schemeClr>
-        </a:solidFill>
-        <a:ln w="25400" cap="flat" cmpd="sng" algn="ctr">
-          <a:solidFill>
-            <a:schemeClr val="lt1">
-              <a:hueOff val="0"/>
-              <a:satOff val="0"/>
-              <a:lumOff val="0"/>
-              <a:alphaOff val="0"/>
-            </a:schemeClr>
-          </a:solidFill>
-          <a:prstDash val="solid"/>
-        </a:ln>
-        <a:effectLst/>
-        <a:scene3d>
-          <a:camera prst="orthographicFront"/>
-          <a:lightRig rig="threePt" dir="t"/>
-        </a:scene3d>
-        <a:sp3d>
-          <a:bevelT/>
-        </a:sp3d>
-      </dsp:spPr>
-      <dsp:style>
-        <a:lnRef idx="2">
-          <a:scrgbClr r="0" g="0" b="0"/>
-        </a:lnRef>
-        <a:fillRef idx="1">
-          <a:scrgbClr r="0" g="0" b="0"/>
-        </a:fillRef>
-        <a:effectRef idx="0">
-          <a:scrgbClr r="0" g="0" b="0"/>
-        </a:effectRef>
-        <a:fontRef idx="minor">
-          <a:schemeClr val="lt1"/>
-        </a:fontRef>
-      </dsp:style>
-      <dsp:txBody>
-        <a:bodyPr spcFirstLastPara="0" vert="vert270" wrap="square" lIns="0" tIns="61722" rIns="80010" bIns="0" numCol="1" spcCol="1270" anchor="ctr" anchorCtr="0">
-          <a:noAutofit/>
-        </a:bodyPr>
-        <a:lstStyle/>
-        <a:p>
-          <a:pPr lvl="0" algn="r" defTabSz="800100">
-            <a:lnSpc>
-              <a:spcPct val="90000"/>
-            </a:lnSpc>
-            <a:spcBef>
-              <a:spcPct val="0"/>
-            </a:spcBef>
-            <a:spcAft>
-              <a:spcPct val="35000"/>
-            </a:spcAft>
-          </a:pPr>
-          <a:r>
-            <a:rPr lang="bg-BG" sz="1800" kern="1200" dirty="0" smtClean="0"/>
-            <a:t> </a:t>
-          </a:r>
-          <a:endParaRPr lang="en-GB" sz="1800" kern="1200" dirty="0"/>
-        </a:p>
-      </dsp:txBody>
-      <dsp:txXfrm rot="16200000">
-        <a:off x="3897046" y="444494"/>
-        <a:ext cx="1069010" cy="180199"/>
-      </dsp:txXfrm>
-    </dsp:sp>
-    <dsp:sp modelId="{2B0F0261-51B8-4136-8B69-9D5CE514A5D0}">
-      <dsp:nvSpPr>
-        <dsp:cNvPr id="0" name=""/>
-        <dsp:cNvSpPr/>
-      </dsp:nvSpPr>
-      <dsp:spPr>
-        <a:xfrm rot="5400000">
-          <a:off x="4243157" y="1285055"/>
-          <a:ext cx="241339" cy="245690"/>
-        </a:xfrm>
-        <a:prstGeom prst="flowChartExtract">
-          <a:avLst/>
-        </a:prstGeom>
-        <a:noFill/>
-        <a:ln w="25400" cap="flat" cmpd="sng" algn="ctr">
-          <a:noFill/>
-          <a:prstDash val="solid"/>
-        </a:ln>
-        <a:effectLst/>
-      </dsp:spPr>
-      <dsp:style>
-        <a:lnRef idx="2">
-          <a:scrgbClr r="0" g="0" b="0"/>
-        </a:lnRef>
-        <a:fillRef idx="1">
-          <a:scrgbClr r="0" g="0" b="0"/>
-        </a:fillRef>
-        <a:effectRef idx="0">
-          <a:scrgbClr r="0" g="0" b="0"/>
-        </a:effectRef>
-        <a:fontRef idx="minor"/>
-      </dsp:style>
-    </dsp:sp>
-    <dsp:sp modelId="{170144A1-F6B8-44B9-B4B3-C927D7C7FA7E}">
-      <dsp:nvSpPr>
-        <dsp:cNvPr id="0" name=""/>
-        <dsp:cNvSpPr/>
-      </dsp:nvSpPr>
-      <dsp:spPr>
-        <a:xfrm>
-          <a:off x="4575080" y="88"/>
-          <a:ext cx="671241" cy="1303671"/>
-        </a:xfrm>
-        <a:prstGeom prst="rect">
-          <a:avLst/>
-        </a:prstGeom>
-        <a:noFill/>
-        <a:ln w="25400" cap="flat" cmpd="sng" algn="ctr">
-          <a:noFill/>
-          <a:prstDash val="solid"/>
-        </a:ln>
-        <a:effectLst/>
-        <a:scene3d>
-          <a:camera prst="orthographicFront"/>
-          <a:lightRig rig="threePt" dir="t"/>
-        </a:scene3d>
-        <a:sp3d/>
-      </dsp:spPr>
-      <dsp:style>
-        <a:lnRef idx="2">
-          <a:scrgbClr r="0" g="0" b="0"/>
-        </a:lnRef>
-        <a:fillRef idx="1">
-          <a:scrgbClr r="0" g="0" b="0"/>
-        </a:fillRef>
-        <a:effectRef idx="0">
-          <a:scrgbClr r="0" g="0" b="0"/>
-        </a:effectRef>
-        <a:fontRef idx="minor">
-          <a:schemeClr val="lt1"/>
-        </a:fontRef>
-      </dsp:style>
-      <dsp:txBody>
-        <a:bodyPr spcFirstLastPara="0" vert="vert270" wrap="square" lIns="0" tIns="68580" rIns="0" bIns="0" numCol="1" spcCol="1270" anchor="t" anchorCtr="0">
-          <a:noAutofit/>
-        </a:bodyPr>
-        <a:lstStyle/>
-        <a:p>
-          <a:pPr lvl="0" algn="ctr" defTabSz="889000">
-            <a:lnSpc>
-              <a:spcPct val="90000"/>
-            </a:lnSpc>
-            <a:spcBef>
-              <a:spcPct val="0"/>
-            </a:spcBef>
-            <a:spcAft>
-              <a:spcPct val="35000"/>
-            </a:spcAft>
-          </a:pPr>
-          <a:r>
-            <a:rPr lang="bg-BG" sz="2000" kern="1200" dirty="0" smtClean="0"/>
-            <a:t>Междинна проверка</a:t>
-          </a:r>
-          <a:endParaRPr lang="en-GB" sz="2000" kern="1200" dirty="0"/>
-        </a:p>
-      </dsp:txBody>
-      <dsp:txXfrm>
-        <a:off x="4575080" y="88"/>
-        <a:ext cx="671241" cy="1303671"/>
-      </dsp:txXfrm>
-    </dsp:sp>
-    <dsp:sp modelId="{8CCD22DA-1596-43E8-9230-0BDDDB40E655}">
-      <dsp:nvSpPr>
-        <dsp:cNvPr id="0" name=""/>
-        <dsp:cNvSpPr/>
-      </dsp:nvSpPr>
-      <dsp:spPr>
-        <a:xfrm>
-          <a:off x="5317834" y="88"/>
-          <a:ext cx="1637935" cy="1303671"/>
-        </a:xfrm>
-        <a:prstGeom prst="roundRect">
-          <a:avLst>
-            <a:gd name="adj" fmla="val 5000"/>
-          </a:avLst>
-        </a:prstGeom>
-        <a:solidFill>
-          <a:schemeClr val="accent1">
-            <a:hueOff val="0"/>
-            <a:satOff val="0"/>
-            <a:lumOff val="0"/>
-            <a:alphaOff val="0"/>
-          </a:schemeClr>
-        </a:solidFill>
-        <a:ln w="25400" cap="flat" cmpd="sng" algn="ctr">
-          <a:solidFill>
-            <a:schemeClr val="lt1">
-              <a:hueOff val="0"/>
-              <a:satOff val="0"/>
-              <a:lumOff val="0"/>
-              <a:alphaOff val="0"/>
-            </a:schemeClr>
-          </a:solidFill>
-          <a:prstDash val="solid"/>
-        </a:ln>
-        <a:effectLst/>
-        <a:scene3d>
-          <a:camera prst="orthographicFront"/>
-          <a:lightRig rig="threePt" dir="t"/>
-        </a:scene3d>
-        <a:sp3d>
-          <a:bevelT/>
-        </a:sp3d>
-      </dsp:spPr>
-      <dsp:style>
-        <a:lnRef idx="2">
-          <a:scrgbClr r="0" g="0" b="0"/>
-        </a:lnRef>
-        <a:fillRef idx="1">
-          <a:scrgbClr r="0" g="0" b="0"/>
-        </a:fillRef>
-        <a:effectRef idx="0">
-          <a:scrgbClr r="0" g="0" b="0"/>
-        </a:effectRef>
-        <a:fontRef idx="minor">
-          <a:schemeClr val="lt1"/>
-        </a:fontRef>
-      </dsp:style>
-      <dsp:txBody>
-        <a:bodyPr spcFirstLastPara="0" vert="horz" wrap="square" lIns="0" tIns="61722" rIns="80010" bIns="0" numCol="1" spcCol="1270" anchor="t" anchorCtr="0">
-          <a:noAutofit/>
-        </a:bodyPr>
-        <a:lstStyle/>
-        <a:p>
-          <a:pPr lvl="0" algn="r" defTabSz="800100">
-            <a:lnSpc>
-              <a:spcPct val="90000"/>
-            </a:lnSpc>
-            <a:spcBef>
-              <a:spcPct val="0"/>
-            </a:spcBef>
-            <a:spcAft>
-              <a:spcPct val="35000"/>
-            </a:spcAft>
-          </a:pPr>
-          <a:r>
-            <a:rPr lang="bg-BG" sz="1800" kern="1200" dirty="0" smtClean="0"/>
-            <a:t> </a:t>
-          </a:r>
-          <a:endParaRPr lang="en-GB" sz="1800" kern="1200" dirty="0"/>
-        </a:p>
-      </dsp:txBody>
-      <dsp:txXfrm rot="16200000">
-        <a:off x="4947122" y="370800"/>
-        <a:ext cx="1069010" cy="327587"/>
-      </dsp:txXfrm>
-    </dsp:sp>
-    <dsp:sp modelId="{E354B553-921B-4DD0-895C-F356BCF978E3}">
-      <dsp:nvSpPr>
-        <dsp:cNvPr id="0" name=""/>
-        <dsp:cNvSpPr/>
-      </dsp:nvSpPr>
-      <dsp:spPr>
-        <a:xfrm rot="5400000">
-          <a:off x="5205354" y="1285055"/>
-          <a:ext cx="241339" cy="245690"/>
-        </a:xfrm>
-        <a:prstGeom prst="flowChartExtract">
-          <a:avLst/>
-        </a:prstGeom>
-        <a:solidFill>
-          <a:schemeClr val="lt1">
-            <a:hueOff val="0"/>
-            <a:satOff val="0"/>
-            <a:lumOff val="0"/>
-            <a:alphaOff val="0"/>
-          </a:schemeClr>
-        </a:solidFill>
-        <a:ln w="25400" cap="flat" cmpd="sng" algn="ctr">
-          <a:solidFill>
-            <a:schemeClr val="accent1">
-              <a:hueOff val="0"/>
-              <a:satOff val="0"/>
-              <a:lumOff val="0"/>
-              <a:alphaOff val="0"/>
-            </a:schemeClr>
-          </a:solidFill>
-          <a:prstDash val="solid"/>
-        </a:ln>
-        <a:effectLst>
-          <a:outerShdw blurRad="50800" dist="38100" dir="2700000" algn="tl" rotWithShape="0">
-            <a:prstClr val="black">
-              <a:alpha val="40000"/>
-            </a:prstClr>
-          </a:outerShdw>
-        </a:effectLst>
-      </dsp:spPr>
-      <dsp:style>
-        <a:lnRef idx="2">
-          <a:scrgbClr r="0" g="0" b="0"/>
-        </a:lnRef>
-        <a:fillRef idx="1">
-          <a:scrgbClr r="0" g="0" b="0"/>
-        </a:fillRef>
-        <a:effectRef idx="0">
-          <a:scrgbClr r="0" g="0" b="0"/>
-        </a:effectRef>
-        <a:fontRef idx="minor"/>
-      </dsp:style>
-    </dsp:sp>
-    <dsp:sp modelId="{34AD7D33-EFA6-476D-B9F7-9C42818A2646}">
-      <dsp:nvSpPr>
-        <dsp:cNvPr id="0" name=""/>
-        <dsp:cNvSpPr/>
-      </dsp:nvSpPr>
-      <dsp:spPr>
-        <a:xfrm>
-          <a:off x="5645421" y="88"/>
-          <a:ext cx="1220262" cy="1303671"/>
-        </a:xfrm>
-        <a:prstGeom prst="rect">
-          <a:avLst/>
-        </a:prstGeom>
-        <a:noFill/>
-        <a:ln w="25400" cap="flat" cmpd="sng" algn="ctr">
-          <a:noFill/>
-          <a:prstDash val="solid"/>
-        </a:ln>
-        <a:effectLst/>
-        <a:scene3d>
-          <a:camera prst="orthographicFront"/>
-          <a:lightRig rig="threePt" dir="t"/>
-        </a:scene3d>
-        <a:sp3d/>
-      </dsp:spPr>
-      <dsp:style>
-        <a:lnRef idx="2">
-          <a:scrgbClr r="0" g="0" b="0"/>
-        </a:lnRef>
-        <a:fillRef idx="1">
-          <a:scrgbClr r="0" g="0" b="0"/>
-        </a:fillRef>
-        <a:effectRef idx="0">
-          <a:scrgbClr r="0" g="0" b="0"/>
-        </a:effectRef>
-        <a:fontRef idx="minor">
-          <a:schemeClr val="lt1"/>
-        </a:fontRef>
-      </dsp:style>
-      <dsp:txBody>
-        <a:bodyPr spcFirstLastPara="0" vert="horz" wrap="square" lIns="0" tIns="68580" rIns="0" bIns="0" numCol="1" spcCol="1270" anchor="ctr" anchorCtr="0">
-          <a:noAutofit/>
-        </a:bodyPr>
-        <a:lstStyle/>
-        <a:p>
-          <a:pPr lvl="0" algn="l" defTabSz="889000">
-            <a:lnSpc>
-              <a:spcPct val="90000"/>
-            </a:lnSpc>
-            <a:spcBef>
-              <a:spcPct val="0"/>
-            </a:spcBef>
-            <a:spcAft>
-              <a:spcPct val="35000"/>
-            </a:spcAft>
-          </a:pPr>
-          <a:r>
-            <a:rPr lang="bg-BG" sz="2000" kern="1200" dirty="0" smtClean="0"/>
-            <a:t> Писане</a:t>
-          </a:r>
-          <a:endParaRPr lang="en-GB" sz="2000" kern="1200" dirty="0"/>
-        </a:p>
-      </dsp:txBody>
-      <dsp:txXfrm>
-        <a:off x="5645421" y="88"/>
-        <a:ext cx="1220262" cy="1303671"/>
-      </dsp:txXfrm>
-    </dsp:sp>
-    <dsp:sp modelId="{372BC235-BB41-49BC-A658-BA2634AC7419}">
-      <dsp:nvSpPr>
-        <dsp:cNvPr id="0" name=""/>
-        <dsp:cNvSpPr/>
-      </dsp:nvSpPr>
-      <dsp:spPr>
-        <a:xfrm>
-          <a:off x="6998913" y="88"/>
-          <a:ext cx="900995" cy="1303671"/>
-        </a:xfrm>
-        <a:prstGeom prst="roundRect">
-          <a:avLst>
-            <a:gd name="adj" fmla="val 5000"/>
-          </a:avLst>
-        </a:prstGeom>
-        <a:solidFill>
-          <a:schemeClr val="accent3">
-            <a:lumMod val="75000"/>
-          </a:schemeClr>
-        </a:solidFill>
-        <a:ln w="25400" cap="flat" cmpd="sng" algn="ctr">
-          <a:solidFill>
-            <a:schemeClr val="lt1">
-              <a:hueOff val="0"/>
-              <a:satOff val="0"/>
-              <a:lumOff val="0"/>
-              <a:alphaOff val="0"/>
-            </a:schemeClr>
-          </a:solidFill>
-          <a:prstDash val="solid"/>
-        </a:ln>
-        <a:effectLst/>
-        <a:scene3d>
-          <a:camera prst="orthographicFront"/>
-          <a:lightRig rig="threePt" dir="t"/>
-        </a:scene3d>
-        <a:sp3d>
-          <a:bevelT/>
-        </a:sp3d>
-      </dsp:spPr>
-      <dsp:style>
-        <a:lnRef idx="2">
-          <a:scrgbClr r="0" g="0" b="0"/>
-        </a:lnRef>
-        <a:fillRef idx="1">
-          <a:scrgbClr r="0" g="0" b="0"/>
-        </a:fillRef>
-        <a:effectRef idx="0">
-          <a:scrgbClr r="0" g="0" b="0"/>
-        </a:effectRef>
-        <a:fontRef idx="minor">
-          <a:schemeClr val="lt1"/>
-        </a:fontRef>
-      </dsp:style>
-      <dsp:txBody>
-        <a:bodyPr spcFirstLastPara="0" vert="vert270" wrap="square" lIns="0" tIns="61722" rIns="80010" bIns="0" numCol="1" spcCol="1270" anchor="ctr" anchorCtr="0">
-          <a:noAutofit/>
-        </a:bodyPr>
-        <a:lstStyle/>
-        <a:p>
-          <a:pPr lvl="0" algn="r" defTabSz="800100">
-            <a:lnSpc>
-              <a:spcPct val="90000"/>
-            </a:lnSpc>
-            <a:spcBef>
-              <a:spcPct val="0"/>
-            </a:spcBef>
-            <a:spcAft>
-              <a:spcPct val="35000"/>
-            </a:spcAft>
-          </a:pPr>
-          <a:r>
-            <a:rPr lang="bg-BG" sz="1800" kern="1200" dirty="0" smtClean="0"/>
-            <a:t> </a:t>
-          </a:r>
-          <a:r>
-            <a:rPr lang="bg-BG" sz="1800" b="1" kern="1200" dirty="0" smtClean="0"/>
-            <a:t>*</a:t>
-          </a:r>
-          <a:endParaRPr lang="en-GB" sz="1800" b="1" kern="1200" dirty="0"/>
-        </a:p>
-      </dsp:txBody>
-      <dsp:txXfrm rot="16200000">
-        <a:off x="6554507" y="444494"/>
-        <a:ext cx="1069010" cy="180199"/>
-      </dsp:txXfrm>
-    </dsp:sp>
-    <dsp:sp modelId="{58DCDB27-2E21-41EC-9475-7DE708A6EA60}">
-      <dsp:nvSpPr>
-        <dsp:cNvPr id="0" name=""/>
-        <dsp:cNvSpPr/>
-      </dsp:nvSpPr>
-      <dsp:spPr>
-        <a:xfrm rot="5400000">
-          <a:off x="6900617" y="1285055"/>
-          <a:ext cx="241339" cy="245690"/>
-        </a:xfrm>
-        <a:prstGeom prst="flowChartExtract">
-          <a:avLst/>
-        </a:prstGeom>
-        <a:noFill/>
-        <a:ln w="25400" cap="flat" cmpd="sng" algn="ctr">
-          <a:noFill/>
-          <a:prstDash val="solid"/>
-        </a:ln>
-        <a:effectLst/>
-      </dsp:spPr>
-      <dsp:style>
-        <a:lnRef idx="2">
-          <a:scrgbClr r="0" g="0" b="0"/>
-        </a:lnRef>
-        <a:fillRef idx="1">
-          <a:scrgbClr r="0" g="0" b="0"/>
-        </a:fillRef>
-        <a:effectRef idx="0">
-          <a:scrgbClr r="0" g="0" b="0"/>
-        </a:effectRef>
-        <a:fontRef idx="minor"/>
-      </dsp:style>
-    </dsp:sp>
-    <dsp:sp modelId="{73F9FBCE-F2BA-48E6-A20C-68B260B0CFD9}">
-      <dsp:nvSpPr>
-        <dsp:cNvPr id="0" name=""/>
-        <dsp:cNvSpPr/>
-      </dsp:nvSpPr>
-      <dsp:spPr>
-        <a:xfrm>
-          <a:off x="7232540" y="88"/>
-          <a:ext cx="671241" cy="1303671"/>
-        </a:xfrm>
-        <a:prstGeom prst="rect">
-          <a:avLst/>
-        </a:prstGeom>
-        <a:noFill/>
-        <a:ln w="25400" cap="flat" cmpd="sng" algn="ctr">
-          <a:noFill/>
-          <a:prstDash val="solid"/>
-        </a:ln>
-        <a:effectLst/>
-        <a:scene3d>
-          <a:camera prst="orthographicFront"/>
-          <a:lightRig rig="threePt" dir="t"/>
-        </a:scene3d>
-        <a:sp3d/>
-      </dsp:spPr>
-      <dsp:style>
-        <a:lnRef idx="2">
-          <a:scrgbClr r="0" g="0" b="0"/>
-        </a:lnRef>
-        <a:fillRef idx="1">
-          <a:scrgbClr r="0" g="0" b="0"/>
-        </a:fillRef>
-        <a:effectRef idx="0">
-          <a:scrgbClr r="0" g="0" b="0"/>
-        </a:effectRef>
-        <a:fontRef idx="minor">
-          <a:schemeClr val="lt1"/>
-        </a:fontRef>
-      </dsp:style>
-      <dsp:txBody>
-        <a:bodyPr spcFirstLastPara="0" vert="vert270" wrap="square" lIns="0" tIns="68580" rIns="0" bIns="0" numCol="1" spcCol="1270" anchor="ctr" anchorCtr="0">
-          <a:noAutofit/>
-        </a:bodyPr>
-        <a:lstStyle/>
-        <a:p>
-          <a:pPr lvl="0" algn="ctr" defTabSz="889000">
-            <a:lnSpc>
-              <a:spcPct val="90000"/>
-            </a:lnSpc>
-            <a:spcBef>
-              <a:spcPct val="0"/>
-            </a:spcBef>
-            <a:spcAft>
-              <a:spcPct val="35000"/>
-            </a:spcAft>
-          </a:pPr>
-          <a:r>
-            <a:rPr lang="bg-BG" sz="2000" kern="1200" dirty="0" smtClean="0"/>
-            <a:t>Междинна проверка</a:t>
-          </a:r>
-          <a:endParaRPr lang="en-GB" sz="2000" kern="1200" dirty="0"/>
-        </a:p>
-      </dsp:txBody>
-      <dsp:txXfrm>
-        <a:off x="7232540" y="88"/>
-        <a:ext cx="671241" cy="1303671"/>
-      </dsp:txXfrm>
-    </dsp:sp>
   </dsp:spTree>
 </dsp:drawing>
 </file>
@@ -4470,507 +3318,6 @@
       <dsp:cNvGrpSpPr/>
     </dsp:nvGrpSpPr>
     <dsp:grpSpPr/>
-    <dsp:sp modelId="{FBF392DB-A3E0-4F86-8A92-A97E91ECF237}">
-      <dsp:nvSpPr>
-        <dsp:cNvPr id="0" name=""/>
-        <dsp:cNvSpPr/>
-      </dsp:nvSpPr>
-      <dsp:spPr>
-        <a:xfrm>
-          <a:off x="1989982" y="350"/>
-          <a:ext cx="1516305" cy="1516305"/>
-        </a:xfrm>
-        <a:prstGeom prst="ellipse">
-          <a:avLst/>
-        </a:prstGeom>
-        <a:solidFill>
-          <a:srgbClr val="CC3300"/>
-        </a:solidFill>
-        <a:ln w="25400" cap="flat" cmpd="sng" algn="ctr">
-          <a:solidFill>
-            <a:schemeClr val="lt1">
-              <a:hueOff val="0"/>
-              <a:satOff val="0"/>
-              <a:lumOff val="0"/>
-              <a:alphaOff val="0"/>
-            </a:schemeClr>
-          </a:solidFill>
-          <a:prstDash val="solid"/>
-        </a:ln>
-        <a:effectLst/>
-      </dsp:spPr>
-      <dsp:style>
-        <a:lnRef idx="2">
-          <a:scrgbClr r="0" g="0" b="0"/>
-        </a:lnRef>
-        <a:fillRef idx="1">
-          <a:scrgbClr r="0" g="0" b="0"/>
-        </a:fillRef>
-        <a:effectRef idx="0">
-          <a:scrgbClr r="0" g="0" b="0"/>
-        </a:effectRef>
-        <a:fontRef idx="minor">
-          <a:schemeClr val="lt1"/>
-        </a:fontRef>
-      </dsp:style>
-      <dsp:txBody>
-        <a:bodyPr spcFirstLastPara="0" vert="horz" wrap="square" lIns="19050" tIns="19050" rIns="19050" bIns="19050" numCol="1" spcCol="1270" anchor="ctr" anchorCtr="0">
-          <a:noAutofit/>
-        </a:bodyPr>
-        <a:lstStyle/>
-        <a:p>
-          <a:pPr lvl="0" algn="ctr" defTabSz="666750">
-            <a:lnSpc>
-              <a:spcPct val="90000"/>
-            </a:lnSpc>
-            <a:spcBef>
-              <a:spcPct val="0"/>
-            </a:spcBef>
-            <a:spcAft>
-              <a:spcPct val="35000"/>
-            </a:spcAft>
-          </a:pPr>
-          <a:r>
-            <a:rPr lang="en-US" sz="1500" kern="1200" dirty="0" smtClean="0"/>
-            <a:t>[</a:t>
-          </a:r>
-          <a:r>
-            <a:rPr lang="bg-BG" sz="1500" u="sng" kern="1200" dirty="0" smtClean="0"/>
-            <a:t>редактор</a:t>
-          </a:r>
-          <a:r>
-            <a:rPr lang="en-US" sz="1500" kern="1200" dirty="0" smtClean="0"/>
-            <a:t>]</a:t>
-          </a:r>
-          <a:r>
-            <a:rPr lang="bg-BG" sz="1500" kern="1200" dirty="0" smtClean="0"/>
-            <a:t/>
-          </a:r>
-          <a:br>
-            <a:rPr lang="bg-BG" sz="1500" kern="1200" dirty="0" smtClean="0"/>
-          </a:br>
-          <a:r>
-            <a:rPr lang="bg-BG" sz="1500" kern="1200" dirty="0" smtClean="0"/>
-            <a:t>Редакция</a:t>
-          </a:r>
-          <a:br>
-            <a:rPr lang="bg-BG" sz="1500" kern="1200" dirty="0" smtClean="0"/>
-          </a:br>
-          <a:r>
-            <a:rPr lang="bg-BG" sz="1500" kern="1200" dirty="0" smtClean="0"/>
-            <a:t>+</a:t>
-          </a:r>
-          <a:br>
-            <a:rPr lang="bg-BG" sz="1500" kern="1200" dirty="0" smtClean="0"/>
-          </a:br>
-          <a:r>
-            <a:rPr lang="bg-BG" sz="1500" kern="1200" dirty="0" smtClean="0"/>
-            <a:t>коментари</a:t>
-          </a:r>
-          <a:endParaRPr lang="en-GB" sz="1500" kern="1200" dirty="0"/>
-        </a:p>
-      </dsp:txBody>
-      <dsp:txXfrm>
-        <a:off x="2212040" y="222408"/>
-        <a:ext cx="1072189" cy="1072189"/>
-      </dsp:txXfrm>
-    </dsp:sp>
-    <dsp:sp modelId="{4458DCB7-44C6-4976-AA0C-106DD5C3B52A}">
-      <dsp:nvSpPr>
-        <dsp:cNvPr id="0" name=""/>
-        <dsp:cNvSpPr/>
-      </dsp:nvSpPr>
-      <dsp:spPr>
-        <a:xfrm rot="3600000">
-          <a:off x="3110122" y="1478224"/>
-          <a:ext cx="402550" cy="511753"/>
-        </a:xfrm>
-        <a:prstGeom prst="rightArrow">
-          <a:avLst>
-            <a:gd name="adj1" fmla="val 60000"/>
-            <a:gd name="adj2" fmla="val 50000"/>
-          </a:avLst>
-        </a:prstGeom>
-        <a:solidFill>
-          <a:schemeClr val="accent1">
-            <a:tint val="60000"/>
-            <a:hueOff val="0"/>
-            <a:satOff val="0"/>
-            <a:lumOff val="0"/>
-            <a:alphaOff val="0"/>
-          </a:schemeClr>
-        </a:solidFill>
-        <a:ln>
-          <a:noFill/>
-        </a:ln>
-        <a:effectLst/>
-      </dsp:spPr>
-      <dsp:style>
-        <a:lnRef idx="0">
-          <a:scrgbClr r="0" g="0" b="0"/>
-        </a:lnRef>
-        <a:fillRef idx="1">
-          <a:scrgbClr r="0" g="0" b="0"/>
-        </a:fillRef>
-        <a:effectRef idx="0">
-          <a:scrgbClr r="0" g="0" b="0"/>
-        </a:effectRef>
-        <a:fontRef idx="minor">
-          <a:schemeClr val="lt1"/>
-        </a:fontRef>
-      </dsp:style>
-      <dsp:txBody>
-        <a:bodyPr spcFirstLastPara="0" vert="horz" wrap="square" lIns="0" tIns="0" rIns="0" bIns="0" numCol="1" spcCol="1270" anchor="ctr" anchorCtr="0">
-          <a:noAutofit/>
-        </a:bodyPr>
-        <a:lstStyle/>
-        <a:p>
-          <a:pPr lvl="0" algn="ctr" defTabSz="533400">
-            <a:lnSpc>
-              <a:spcPct val="90000"/>
-            </a:lnSpc>
-            <a:spcBef>
-              <a:spcPct val="0"/>
-            </a:spcBef>
-            <a:spcAft>
-              <a:spcPct val="35000"/>
-            </a:spcAft>
-          </a:pPr>
-          <a:endParaRPr lang="en-GB" sz="1200" kern="1200"/>
-        </a:p>
-      </dsp:txBody>
-      <dsp:txXfrm>
-        <a:off x="3140313" y="1528282"/>
-        <a:ext cx="281785" cy="307051"/>
-      </dsp:txXfrm>
-    </dsp:sp>
-    <dsp:sp modelId="{4794164C-215F-44D7-AA8A-923DD1077990}">
-      <dsp:nvSpPr>
-        <dsp:cNvPr id="0" name=""/>
-        <dsp:cNvSpPr/>
-      </dsp:nvSpPr>
-      <dsp:spPr>
-        <a:xfrm>
-          <a:off x="3127900" y="1971280"/>
-          <a:ext cx="1516305" cy="1516305"/>
-        </a:xfrm>
-        <a:prstGeom prst="ellipse">
-          <a:avLst/>
-        </a:prstGeom>
-        <a:solidFill>
-          <a:schemeClr val="accent3">
-            <a:lumMod val="75000"/>
-          </a:schemeClr>
-        </a:solidFill>
-        <a:ln w="25400" cap="flat" cmpd="sng" algn="ctr">
-          <a:solidFill>
-            <a:schemeClr val="lt1">
-              <a:hueOff val="0"/>
-              <a:satOff val="0"/>
-              <a:lumOff val="0"/>
-              <a:alphaOff val="0"/>
-            </a:schemeClr>
-          </a:solidFill>
-          <a:prstDash val="solid"/>
-        </a:ln>
-        <a:effectLst/>
-      </dsp:spPr>
-      <dsp:style>
-        <a:lnRef idx="2">
-          <a:scrgbClr r="0" g="0" b="0"/>
-        </a:lnRef>
-        <a:fillRef idx="1">
-          <a:scrgbClr r="0" g="0" b="0"/>
-        </a:fillRef>
-        <a:effectRef idx="0">
-          <a:scrgbClr r="0" g="0" b="0"/>
-        </a:effectRef>
-        <a:fontRef idx="minor">
-          <a:schemeClr val="lt1"/>
-        </a:fontRef>
-      </dsp:style>
-      <dsp:txBody>
-        <a:bodyPr spcFirstLastPara="0" vert="horz" wrap="square" lIns="19050" tIns="19050" rIns="19050" bIns="19050" numCol="1" spcCol="1270" anchor="ctr" anchorCtr="0">
-          <a:noAutofit/>
-        </a:bodyPr>
-        <a:lstStyle/>
-        <a:p>
-          <a:pPr lvl="0" algn="ctr" defTabSz="666750">
-            <a:lnSpc>
-              <a:spcPct val="90000"/>
-            </a:lnSpc>
-            <a:spcBef>
-              <a:spcPct val="0"/>
-            </a:spcBef>
-            <a:spcAft>
-              <a:spcPct val="35000"/>
-            </a:spcAft>
-          </a:pPr>
-          <a:r>
-            <a:rPr lang="en-US" sz="1500" kern="1200" dirty="0" smtClean="0"/>
-            <a:t>[</a:t>
-          </a:r>
-          <a:r>
-            <a:rPr lang="bg-BG" sz="1500" u="sng" kern="1200" dirty="0" smtClean="0"/>
-            <a:t>автор</a:t>
-          </a:r>
-          <a:r>
-            <a:rPr lang="en-US" sz="1500" kern="1200" dirty="0" smtClean="0"/>
-            <a:t>]</a:t>
-          </a:r>
-          <a:r>
-            <a:rPr lang="bg-BG" sz="1500" kern="1200" dirty="0" smtClean="0"/>
-            <a:t/>
-          </a:r>
-          <a:br>
-            <a:rPr lang="bg-BG" sz="1500" kern="1200" dirty="0" smtClean="0"/>
-          </a:br>
-          <a:r>
-            <a:rPr lang="bg-BG" sz="1500" kern="1200" dirty="0" smtClean="0"/>
-            <a:t>Приемане или отхвърляне</a:t>
-          </a:r>
-          <a:endParaRPr lang="en-GB" sz="1500" kern="1200" dirty="0"/>
-        </a:p>
-      </dsp:txBody>
-      <dsp:txXfrm>
-        <a:off x="3349958" y="2193338"/>
-        <a:ext cx="1072189" cy="1072189"/>
-      </dsp:txXfrm>
-    </dsp:sp>
-    <dsp:sp modelId="{121A796E-B12A-4E1D-AB0F-39162C9B95B0}">
-      <dsp:nvSpPr>
-        <dsp:cNvPr id="0" name=""/>
-        <dsp:cNvSpPr/>
-      </dsp:nvSpPr>
-      <dsp:spPr>
-        <a:xfrm rot="10800000">
-          <a:off x="2558253" y="2473556"/>
-          <a:ext cx="402550" cy="511753"/>
-        </a:xfrm>
-        <a:prstGeom prst="rightArrow">
-          <a:avLst>
-            <a:gd name="adj1" fmla="val 60000"/>
-            <a:gd name="adj2" fmla="val 50000"/>
-          </a:avLst>
-        </a:prstGeom>
-        <a:solidFill>
-          <a:schemeClr val="accent1">
-            <a:tint val="60000"/>
-            <a:hueOff val="0"/>
-            <a:satOff val="0"/>
-            <a:lumOff val="0"/>
-            <a:alphaOff val="0"/>
-          </a:schemeClr>
-        </a:solidFill>
-        <a:ln>
-          <a:noFill/>
-        </a:ln>
-        <a:effectLst/>
-      </dsp:spPr>
-      <dsp:style>
-        <a:lnRef idx="0">
-          <a:scrgbClr r="0" g="0" b="0"/>
-        </a:lnRef>
-        <a:fillRef idx="1">
-          <a:scrgbClr r="0" g="0" b="0"/>
-        </a:fillRef>
-        <a:effectRef idx="0">
-          <a:scrgbClr r="0" g="0" b="0"/>
-        </a:effectRef>
-        <a:fontRef idx="minor">
-          <a:schemeClr val="lt1"/>
-        </a:fontRef>
-      </dsp:style>
-      <dsp:txBody>
-        <a:bodyPr spcFirstLastPara="0" vert="horz" wrap="square" lIns="0" tIns="0" rIns="0" bIns="0" numCol="1" spcCol="1270" anchor="ctr" anchorCtr="0">
-          <a:noAutofit/>
-        </a:bodyPr>
-        <a:lstStyle/>
-        <a:p>
-          <a:pPr lvl="0" algn="ctr" defTabSz="533400">
-            <a:lnSpc>
-              <a:spcPct val="90000"/>
-            </a:lnSpc>
-            <a:spcBef>
-              <a:spcPct val="0"/>
-            </a:spcBef>
-            <a:spcAft>
-              <a:spcPct val="35000"/>
-            </a:spcAft>
-          </a:pPr>
-          <a:endParaRPr lang="en-GB" sz="1200" kern="1200"/>
-        </a:p>
-      </dsp:txBody>
-      <dsp:txXfrm rot="10800000">
-        <a:off x="2679018" y="2575907"/>
-        <a:ext cx="281785" cy="307051"/>
-      </dsp:txXfrm>
-    </dsp:sp>
-    <dsp:sp modelId="{BDF3C6AE-767B-49A0-AF07-A95A95D8AB08}">
-      <dsp:nvSpPr>
-        <dsp:cNvPr id="0" name=""/>
-        <dsp:cNvSpPr/>
-      </dsp:nvSpPr>
-      <dsp:spPr>
-        <a:xfrm>
-          <a:off x="852065" y="1971280"/>
-          <a:ext cx="1516305" cy="1516305"/>
-        </a:xfrm>
-        <a:prstGeom prst="ellipse">
-          <a:avLst/>
-        </a:prstGeom>
-        <a:solidFill>
-          <a:schemeClr val="accent1">
-            <a:hueOff val="0"/>
-            <a:satOff val="0"/>
-            <a:lumOff val="0"/>
-            <a:alphaOff val="0"/>
-          </a:schemeClr>
-        </a:solidFill>
-        <a:ln w="25400" cap="flat" cmpd="sng" algn="ctr">
-          <a:solidFill>
-            <a:schemeClr val="lt1">
-              <a:hueOff val="0"/>
-              <a:satOff val="0"/>
-              <a:lumOff val="0"/>
-              <a:alphaOff val="0"/>
-            </a:schemeClr>
-          </a:solidFill>
-          <a:prstDash val="solid"/>
-        </a:ln>
-        <a:effectLst/>
-      </dsp:spPr>
-      <dsp:style>
-        <a:lnRef idx="2">
-          <a:scrgbClr r="0" g="0" b="0"/>
-        </a:lnRef>
-        <a:fillRef idx="1">
-          <a:scrgbClr r="0" g="0" b="0"/>
-        </a:fillRef>
-        <a:effectRef idx="0">
-          <a:scrgbClr r="0" g="0" b="0"/>
-        </a:effectRef>
-        <a:fontRef idx="minor">
-          <a:schemeClr val="lt1"/>
-        </a:fontRef>
-      </dsp:style>
-      <dsp:txBody>
-        <a:bodyPr spcFirstLastPara="0" vert="horz" wrap="square" lIns="19050" tIns="19050" rIns="19050" bIns="19050" numCol="1" spcCol="1270" anchor="ctr" anchorCtr="0">
-          <a:noAutofit/>
-        </a:bodyPr>
-        <a:lstStyle/>
-        <a:p>
-          <a:pPr lvl="0" algn="ctr" defTabSz="666750">
-            <a:lnSpc>
-              <a:spcPct val="90000"/>
-            </a:lnSpc>
-            <a:spcBef>
-              <a:spcPct val="0"/>
-            </a:spcBef>
-            <a:spcAft>
-              <a:spcPct val="35000"/>
-            </a:spcAft>
-          </a:pPr>
-          <a:r>
-            <a:rPr lang="en-US" sz="1500" kern="1200" dirty="0" smtClean="0"/>
-            <a:t>[</a:t>
-          </a:r>
-          <a:r>
-            <a:rPr lang="bg-BG" sz="1500" u="sng" kern="1200" dirty="0" smtClean="0"/>
-            <a:t>автор</a:t>
-          </a:r>
-          <a:r>
-            <a:rPr lang="en-US" sz="1500" kern="1200" dirty="0" smtClean="0"/>
-            <a:t>]</a:t>
-          </a:r>
-          <a:r>
-            <a:rPr lang="bg-BG" sz="1500" kern="1200" dirty="0" smtClean="0"/>
-            <a:t/>
-          </a:r>
-          <a:br>
-            <a:rPr lang="bg-BG" sz="1500" kern="1200" dirty="0" smtClean="0"/>
-          </a:br>
-          <a:r>
-            <a:rPr lang="bg-BG" sz="1500" kern="1200" dirty="0" smtClean="0"/>
-            <a:t>Дописване?</a:t>
-          </a:r>
-          <a:endParaRPr lang="en-GB" sz="1500" kern="1200" dirty="0"/>
-        </a:p>
-      </dsp:txBody>
-      <dsp:txXfrm>
-        <a:off x="1074123" y="2193338"/>
-        <a:ext cx="1072189" cy="1072189"/>
-      </dsp:txXfrm>
-    </dsp:sp>
-    <dsp:sp modelId="{65009C8B-F211-4040-AE06-E7C975361030}">
-      <dsp:nvSpPr>
-        <dsp:cNvPr id="0" name=""/>
-        <dsp:cNvSpPr/>
-      </dsp:nvSpPr>
-      <dsp:spPr>
-        <a:xfrm rot="18000000">
-          <a:off x="1972205" y="1497958"/>
-          <a:ext cx="402550" cy="511753"/>
-        </a:xfrm>
-        <a:prstGeom prst="rightArrow">
-          <a:avLst>
-            <a:gd name="adj1" fmla="val 60000"/>
-            <a:gd name="adj2" fmla="val 50000"/>
-          </a:avLst>
-        </a:prstGeom>
-        <a:solidFill>
-          <a:schemeClr val="accent1">
-            <a:tint val="60000"/>
-            <a:hueOff val="0"/>
-            <a:satOff val="0"/>
-            <a:lumOff val="0"/>
-            <a:alphaOff val="0"/>
-          </a:schemeClr>
-        </a:solidFill>
-        <a:ln>
-          <a:noFill/>
-        </a:ln>
-        <a:effectLst/>
-      </dsp:spPr>
-      <dsp:style>
-        <a:lnRef idx="0">
-          <a:scrgbClr r="0" g="0" b="0"/>
-        </a:lnRef>
-        <a:fillRef idx="1">
-          <a:scrgbClr r="0" g="0" b="0"/>
-        </a:fillRef>
-        <a:effectRef idx="0">
-          <a:scrgbClr r="0" g="0" b="0"/>
-        </a:effectRef>
-        <a:fontRef idx="minor">
-          <a:schemeClr val="lt1"/>
-        </a:fontRef>
-      </dsp:style>
-      <dsp:txBody>
-        <a:bodyPr spcFirstLastPara="0" vert="horz" wrap="square" lIns="0" tIns="0" rIns="0" bIns="0" numCol="1" spcCol="1270" anchor="ctr" anchorCtr="0">
-          <a:noAutofit/>
-        </a:bodyPr>
-        <a:lstStyle/>
-        <a:p>
-          <a:pPr lvl="0" algn="ctr" defTabSz="533400">
-            <a:lnSpc>
-              <a:spcPct val="90000"/>
-            </a:lnSpc>
-            <a:spcBef>
-              <a:spcPct val="0"/>
-            </a:spcBef>
-            <a:spcAft>
-              <a:spcPct val="35000"/>
-            </a:spcAft>
-          </a:pPr>
-          <a:endParaRPr lang="en-GB" sz="1200" kern="1200"/>
-        </a:p>
-      </dsp:txBody>
-      <dsp:txXfrm>
-        <a:off x="2002396" y="1652602"/>
-        <a:ext cx="281785" cy="307051"/>
-      </dsp:txXfrm>
-    </dsp:sp>
   </dsp:spTree>
 </dsp:drawing>
 </file>
@@ -7773,7 +6120,7 @@
           <a:p>
             <a:fld id="{9127F9E0-0A34-41D2-A749-492CDAC5D341}" type="datetimeFigureOut">
               <a:rPr lang="en-GB" smtClean="0"/>
-              <a:t>12/08/2012</a:t>
+              <a:t>11/11/2012</a:t>
             </a:fld>
             <a:endParaRPr lang="en-GB"/>
           </a:p>
@@ -7943,7 +6290,7 @@
           <a:p>
             <a:fld id="{9127F9E0-0A34-41D2-A749-492CDAC5D341}" type="datetimeFigureOut">
               <a:rPr lang="en-GB" smtClean="0"/>
-              <a:t>12/08/2012</a:t>
+              <a:t>11/11/2012</a:t>
             </a:fld>
             <a:endParaRPr lang="en-GB"/>
           </a:p>
@@ -8123,7 +6470,7 @@
           <a:p>
             <a:fld id="{9127F9E0-0A34-41D2-A749-492CDAC5D341}" type="datetimeFigureOut">
               <a:rPr lang="en-GB" smtClean="0"/>
-              <a:t>12/08/2012</a:t>
+              <a:t>11/11/2012</a:t>
             </a:fld>
             <a:endParaRPr lang="en-GB"/>
           </a:p>
@@ -8293,7 +6640,7 @@
           <a:p>
             <a:fld id="{9127F9E0-0A34-41D2-A749-492CDAC5D341}" type="datetimeFigureOut">
               <a:rPr lang="en-GB" smtClean="0"/>
-              <a:t>12/08/2012</a:t>
+              <a:t>11/11/2012</a:t>
             </a:fld>
             <a:endParaRPr lang="en-GB"/>
           </a:p>
@@ -8539,7 +6886,7 @@
           <a:p>
             <a:fld id="{9127F9E0-0A34-41D2-A749-492CDAC5D341}" type="datetimeFigureOut">
               <a:rPr lang="en-GB" smtClean="0"/>
-              <a:t>12/08/2012</a:t>
+              <a:t>11/11/2012</a:t>
             </a:fld>
             <a:endParaRPr lang="en-GB"/>
           </a:p>
@@ -8827,7 +7174,7 @@
           <a:p>
             <a:fld id="{9127F9E0-0A34-41D2-A749-492CDAC5D341}" type="datetimeFigureOut">
               <a:rPr lang="en-GB" smtClean="0"/>
-              <a:t>12/08/2012</a:t>
+              <a:t>11/11/2012</a:t>
             </a:fld>
             <a:endParaRPr lang="en-GB"/>
           </a:p>
@@ -9249,7 +7596,7 @@
           <a:p>
             <a:fld id="{9127F9E0-0A34-41D2-A749-492CDAC5D341}" type="datetimeFigureOut">
               <a:rPr lang="en-GB" smtClean="0"/>
-              <a:t>12/08/2012</a:t>
+              <a:t>11/11/2012</a:t>
             </a:fld>
             <a:endParaRPr lang="en-GB"/>
           </a:p>
@@ -9367,7 +7714,7 @@
           <a:p>
             <a:fld id="{9127F9E0-0A34-41D2-A749-492CDAC5D341}" type="datetimeFigureOut">
               <a:rPr lang="en-GB" smtClean="0"/>
-              <a:t>12/08/2012</a:t>
+              <a:t>11/11/2012</a:t>
             </a:fld>
             <a:endParaRPr lang="en-GB"/>
           </a:p>
@@ -9462,7 +7809,7 @@
           <a:p>
             <a:fld id="{9127F9E0-0A34-41D2-A749-492CDAC5D341}" type="datetimeFigureOut">
               <a:rPr lang="en-GB" smtClean="0"/>
-              <a:t>12/08/2012</a:t>
+              <a:t>11/11/2012</a:t>
             </a:fld>
             <a:endParaRPr lang="en-GB"/>
           </a:p>
@@ -9739,7 +8086,7 @@
           <a:p>
             <a:fld id="{9127F9E0-0A34-41D2-A749-492CDAC5D341}" type="datetimeFigureOut">
               <a:rPr lang="en-GB" smtClean="0"/>
-              <a:t>12/08/2012</a:t>
+              <a:t>11/11/2012</a:t>
             </a:fld>
             <a:endParaRPr lang="en-GB"/>
           </a:p>
@@ -9992,7 +8339,7 @@
           <a:p>
             <a:fld id="{9127F9E0-0A34-41D2-A749-492CDAC5D341}" type="datetimeFigureOut">
               <a:rPr lang="en-GB" smtClean="0"/>
-              <a:t>12/08/2012</a:t>
+              <a:t>11/11/2012</a:t>
             </a:fld>
             <a:endParaRPr lang="en-GB"/>
           </a:p>
@@ -10205,7 +8552,7 @@
           <a:p>
             <a:fld id="{9127F9E0-0A34-41D2-A749-492CDAC5D341}" type="datetimeFigureOut">
               <a:rPr lang="en-GB" smtClean="0"/>
-              <a:t>12/08/2012</a:t>
+              <a:t>11/11/2012</a:t>
             </a:fld>
             <a:endParaRPr lang="en-GB"/>
           </a:p>
@@ -10620,11 +8967,7 @@
           <a:p>
             <a:r>
               <a:rPr lang="bg-BG" dirty="0" smtClean="0"/>
-              <a:t>Трета организационна </a:t>
-            </a:r>
-            <a:r>
-              <a:rPr lang="bg-BG" dirty="0" smtClean="0"/>
-              <a:t>сбирка</a:t>
+              <a:t>Трета организационна сбирка</a:t>
             </a:r>
           </a:p>
           <a:p>
@@ -17559,7 +15902,6 @@
               <a:rPr lang="bg-BG" dirty="0" smtClean="0"/>
               <a:t>Сашо Янакиев</a:t>
             </a:r>
-            <a:endParaRPr lang="bg-BG" dirty="0" smtClean="0"/>
           </a:p>
           <a:p>
             <a:pPr>
@@ -17590,7 +15932,6 @@
               <a:rPr lang="bg-BG" dirty="0" smtClean="0"/>
               <a:t>Любо Велков</a:t>
             </a:r>
-            <a:endParaRPr lang="bg-BG" dirty="0" smtClean="0"/>
           </a:p>
           <a:p>
             <a:endParaRPr lang="en-GB" dirty="0"/>
@@ -19242,11 +17583,7 @@
           <a:p>
             <a:r>
               <a:rPr lang="bg-BG" dirty="0" smtClean="0"/>
-              <a:t>Състояние на </a:t>
-            </a:r>
-            <a:r>
-              <a:rPr lang="bg-BG" dirty="0" smtClean="0"/>
-              <a:t>работата</a:t>
+              <a:t>Състояние на работата</a:t>
             </a:r>
             <a:br>
               <a:rPr lang="bg-BG" dirty="0" smtClean="0"/>
@@ -19456,11 +17793,7 @@
           <a:p>
             <a:r>
               <a:rPr lang="bg-BG" dirty="0" smtClean="0"/>
-              <a:t>Състояние на </a:t>
-            </a:r>
-            <a:r>
-              <a:rPr lang="bg-BG" dirty="0" smtClean="0"/>
-              <a:t>работата</a:t>
+              <a:t>Състояние на работата</a:t>
             </a:r>
             <a:br>
               <a:rPr lang="bg-BG" dirty="0" smtClean="0"/>
@@ -19550,70 +17883,149 @@
           </a:p>
         </p:txBody>
       </p:sp>
-      <p:pic>
-        <p:nvPicPr>
-          <p:cNvPr id="1029" name="Picture 5"/>
-          <p:cNvPicPr>
-            <a:picLocks noChangeAspect="1" noChangeArrowheads="1"/>
-          </p:cNvPicPr>
+      <p:grpSp>
+        <p:nvGrpSpPr>
+          <p:cNvPr id="4" name="Group 3"/>
+          <p:cNvGrpSpPr/>
           <p:nvPr/>
-        </p:nvPicPr>
-        <p:blipFill>
-          <a:blip r:embed="rId2">
-            <a:extLst>
-              <a:ext uri="{28A0092B-C50C-407E-A947-70E740481C1C}">
-                <a14:useLocalDpi xmlns:a14="http://schemas.microsoft.com/office/drawing/2010/main" val="0"/>
-              </a:ext>
-            </a:extLst>
-          </a:blip>
-          <a:srcRect/>
-          <a:stretch>
-            <a:fillRect/>
-          </a:stretch>
-        </p:blipFill>
-        <p:spPr bwMode="auto">
+        </p:nvGrpSpPr>
+        <p:grpSpPr>
           <a:xfrm>
             <a:off x="572317" y="1628800"/>
             <a:ext cx="7952800" cy="3980148"/>
+            <a:chOff x="572317" y="1628800"/>
+            <a:chExt cx="7952800" cy="3980148"/>
           </a:xfrm>
-          <a:prstGeom prst="rect">
-            <a:avLst/>
-          </a:prstGeom>
-          <a:noFill/>
-          <a:ln>
+        </p:grpSpPr>
+        <p:pic>
+          <p:nvPicPr>
+            <p:cNvPr id="1029" name="Picture 5"/>
+            <p:cNvPicPr>
+              <a:picLocks noChangeAspect="1" noChangeArrowheads="1"/>
+            </p:cNvPicPr>
+            <p:nvPr/>
+          </p:nvPicPr>
+          <p:blipFill>
+            <a:blip r:embed="rId2">
+              <a:extLst>
+                <a:ext uri="{28A0092B-C50C-407E-A947-70E740481C1C}">
+                  <a14:useLocalDpi xmlns:a14="http://schemas.microsoft.com/office/drawing/2010/main" val="0"/>
+                </a:ext>
+              </a:extLst>
+            </a:blip>
+            <a:srcRect/>
+            <a:stretch>
+              <a:fillRect/>
+            </a:stretch>
+          </p:blipFill>
+          <p:spPr bwMode="auto">
+            <a:xfrm>
+              <a:off x="572317" y="1628800"/>
+              <a:ext cx="7952800" cy="3980148"/>
+            </a:xfrm>
+            <a:prstGeom prst="rect">
+              <a:avLst/>
+            </a:prstGeom>
             <a:noFill/>
-          </a:ln>
-          <a:effectLst/>
-          <a:extLst>
-            <a:ext uri="{909E8E84-426E-40DD-AFC4-6F175D3DCCD1}">
-              <a14:hiddenFill xmlns:a14="http://schemas.microsoft.com/office/drawing/2010/main">
-                <a:solidFill>
-                  <a:schemeClr val="accent1"/>
-                </a:solidFill>
-              </a14:hiddenFill>
-            </a:ext>
-            <a:ext uri="{91240B29-F687-4F45-9708-019B960494DF}">
-              <a14:hiddenLine xmlns:a14="http://schemas.microsoft.com/office/drawing/2010/main" w="9525">
-                <a:solidFill>
-                  <a:schemeClr val="tx1"/>
-                </a:solidFill>
-                <a:miter lim="800000"/>
-                <a:headEnd/>
-                <a:tailEnd/>
-              </a14:hiddenLine>
-            </a:ext>
-            <a:ext uri="{AF507438-7753-43E0-B8FC-AC1667EBCBE1}">
-              <a14:hiddenEffects xmlns:a14="http://schemas.microsoft.com/office/drawing/2010/main">
-                <a:effectLst>
-                  <a:outerShdw dist="35921" dir="2700000" algn="ctr" rotWithShape="0">
-                    <a:schemeClr val="bg2"/>
-                  </a:outerShdw>
-                </a:effectLst>
-              </a14:hiddenEffects>
-            </a:ext>
-          </a:extLst>
-        </p:spPr>
-      </p:pic>
+            <a:ln>
+              <a:noFill/>
+            </a:ln>
+            <a:effectLst/>
+            <a:extLst>
+              <a:ext uri="{909E8E84-426E-40DD-AFC4-6F175D3DCCD1}">
+                <a14:hiddenFill xmlns:a14="http://schemas.microsoft.com/office/drawing/2010/main">
+                  <a:solidFill>
+                    <a:schemeClr val="accent1"/>
+                  </a:solidFill>
+                </a14:hiddenFill>
+              </a:ext>
+              <a:ext uri="{91240B29-F687-4F45-9708-019B960494DF}">
+                <a14:hiddenLine xmlns:a14="http://schemas.microsoft.com/office/drawing/2010/main" w="9525">
+                  <a:solidFill>
+                    <a:schemeClr val="tx1"/>
+                  </a:solidFill>
+                  <a:miter lim="800000"/>
+                  <a:headEnd/>
+                  <a:tailEnd/>
+                </a14:hiddenLine>
+              </a:ext>
+              <a:ext uri="{AF507438-7753-43E0-B8FC-AC1667EBCBE1}">
+                <a14:hiddenEffects xmlns:a14="http://schemas.microsoft.com/office/drawing/2010/main">
+                  <a:effectLst>
+                    <a:outerShdw dist="35921" dir="2700000" algn="ctr" rotWithShape="0">
+                      <a:schemeClr val="bg2"/>
+                    </a:outerShdw>
+                  </a:effectLst>
+                </a14:hiddenEffects>
+              </a:ext>
+            </a:extLst>
+          </p:spPr>
+        </p:pic>
+        <p:pic>
+          <p:nvPicPr>
+            <p:cNvPr id="6" name="Picture 3"/>
+            <p:cNvPicPr>
+              <a:picLocks noChangeAspect="1" noChangeArrowheads="1"/>
+            </p:cNvPicPr>
+            <p:nvPr/>
+          </p:nvPicPr>
+          <p:blipFill>
+            <a:blip r:embed="rId3">
+              <a:extLst>
+                <a:ext uri="{28A0092B-C50C-407E-A947-70E740481C1C}">
+                  <a14:useLocalDpi xmlns:a14="http://schemas.microsoft.com/office/drawing/2010/main" val="0"/>
+                </a:ext>
+              </a:extLst>
+            </a:blip>
+            <a:srcRect/>
+            <a:stretch>
+              <a:fillRect/>
+            </a:stretch>
+          </p:blipFill>
+          <p:spPr bwMode="auto">
+            <a:xfrm>
+              <a:off x="4003730" y="4025260"/>
+              <a:ext cx="993454" cy="130331"/>
+            </a:xfrm>
+            <a:prstGeom prst="rect">
+              <a:avLst/>
+            </a:prstGeom>
+            <a:noFill/>
+            <a:ln>
+              <a:noFill/>
+            </a:ln>
+            <a:effectLst/>
+            <a:extLst>
+              <a:ext uri="{909E8E84-426E-40DD-AFC4-6F175D3DCCD1}">
+                <a14:hiddenFill xmlns:a14="http://schemas.microsoft.com/office/drawing/2010/main">
+                  <a:solidFill>
+                    <a:schemeClr val="accent1"/>
+                  </a:solidFill>
+                </a14:hiddenFill>
+              </a:ext>
+              <a:ext uri="{91240B29-F687-4F45-9708-019B960494DF}">
+                <a14:hiddenLine xmlns:a14="http://schemas.microsoft.com/office/drawing/2010/main" w="9525">
+                  <a:solidFill>
+                    <a:schemeClr val="tx1"/>
+                  </a:solidFill>
+                  <a:miter lim="800000"/>
+                  <a:headEnd/>
+                  <a:tailEnd/>
+                </a14:hiddenLine>
+              </a:ext>
+              <a:ext uri="{AF507438-7753-43E0-B8FC-AC1667EBCBE1}">
+                <a14:hiddenEffects xmlns:a14="http://schemas.microsoft.com/office/drawing/2010/main">
+                  <a:effectLst>
+                    <a:outerShdw dist="35921" dir="2700000" algn="ctr" rotWithShape="0">
+                      <a:schemeClr val="bg2"/>
+                    </a:outerShdw>
+                  </a:effectLst>
+                </a14:hiddenEffects>
+              </a:ext>
+            </a:extLst>
+          </p:spPr>
+        </p:pic>
+      </p:grpSp>
     </p:spTree>
     <p:extLst>
       <p:ext uri="{BB962C8B-B14F-4D97-AF65-F5344CB8AC3E}">
@@ -19670,11 +18082,7 @@
           <a:p>
             <a:r>
               <a:rPr lang="bg-BG" dirty="0" smtClean="0"/>
-              <a:t>Състояние на </a:t>
-            </a:r>
-            <a:r>
-              <a:rPr lang="bg-BG" dirty="0" smtClean="0"/>
-              <a:t>работата</a:t>
+              <a:t>Състояние на работата</a:t>
             </a:r>
             <a:br>
               <a:rPr lang="bg-BG" dirty="0" smtClean="0"/>
@@ -19884,11 +18292,7 @@
           <a:p>
             <a:r>
               <a:rPr lang="bg-BG" dirty="0" smtClean="0"/>
-              <a:t>Състояние на </a:t>
-            </a:r>
-            <a:r>
-              <a:rPr lang="bg-BG" dirty="0" smtClean="0"/>
-              <a:t>работата</a:t>
+              <a:t>Състояние на работата</a:t>
             </a:r>
             <a:br>
               <a:rPr lang="bg-BG" dirty="0" smtClean="0"/>
@@ -19991,70 +18395,6 @@
           </a:p>
         </p:txBody>
       </p:sp>
-      <p:pic>
-        <p:nvPicPr>
-          <p:cNvPr id="4098" name="Picture 2"/>
-          <p:cNvPicPr>
-            <a:picLocks noChangeAspect="1" noChangeArrowheads="1"/>
-          </p:cNvPicPr>
-          <p:nvPr/>
-        </p:nvPicPr>
-        <p:blipFill>
-          <a:blip r:embed="rId2">
-            <a:extLst>
-              <a:ext uri="{28A0092B-C50C-407E-A947-70E740481C1C}">
-                <a14:useLocalDpi xmlns:a14="http://schemas.microsoft.com/office/drawing/2010/main" val="0"/>
-              </a:ext>
-            </a:extLst>
-          </a:blip>
-          <a:srcRect/>
-          <a:stretch>
-            <a:fillRect/>
-          </a:stretch>
-        </p:blipFill>
-        <p:spPr bwMode="auto">
-          <a:xfrm>
-            <a:off x="523153" y="1628800"/>
-            <a:ext cx="8097692" cy="4026227"/>
-          </a:xfrm>
-          <a:prstGeom prst="rect">
-            <a:avLst/>
-          </a:prstGeom>
-          <a:noFill/>
-          <a:ln>
-            <a:noFill/>
-          </a:ln>
-          <a:effectLst/>
-          <a:extLst>
-            <a:ext uri="{909E8E84-426E-40DD-AFC4-6F175D3DCCD1}">
-              <a14:hiddenFill xmlns:a14="http://schemas.microsoft.com/office/drawing/2010/main">
-                <a:solidFill>
-                  <a:schemeClr val="accent1"/>
-                </a:solidFill>
-              </a14:hiddenFill>
-            </a:ext>
-            <a:ext uri="{91240B29-F687-4F45-9708-019B960494DF}">
-              <a14:hiddenLine xmlns:a14="http://schemas.microsoft.com/office/drawing/2010/main" w="9525">
-                <a:solidFill>
-                  <a:schemeClr val="tx1"/>
-                </a:solidFill>
-                <a:miter lim="800000"/>
-                <a:headEnd/>
-                <a:tailEnd/>
-              </a14:hiddenLine>
-            </a:ext>
-            <a:ext uri="{AF507438-7753-43E0-B8FC-AC1667EBCBE1}">
-              <a14:hiddenEffects xmlns:a14="http://schemas.microsoft.com/office/drawing/2010/main">
-                <a:effectLst>
-                  <a:outerShdw dist="35921" dir="2700000" algn="ctr" rotWithShape="0">
-                    <a:schemeClr val="bg2"/>
-                  </a:outerShdw>
-                </a:effectLst>
-              </a14:hiddenEffects>
-            </a:ext>
-          </a:extLst>
-        </p:spPr>
-      </p:pic>
       <p:sp>
         <p:nvSpPr>
           <p:cNvPr id="4" name="TextBox 3"/>
@@ -20355,6 +18695,149 @@
           </a:p>
         </p:txBody>
       </p:sp>
+      <p:grpSp>
+        <p:nvGrpSpPr>
+          <p:cNvPr id="5" name="Group 4"/>
+          <p:cNvGrpSpPr/>
+          <p:nvPr/>
+        </p:nvGrpSpPr>
+        <p:grpSpPr>
+          <a:xfrm>
+            <a:off x="523153" y="1628800"/>
+            <a:ext cx="8097692" cy="4026227"/>
+            <a:chOff x="523153" y="1628800"/>
+            <a:chExt cx="8097692" cy="4026227"/>
+          </a:xfrm>
+        </p:grpSpPr>
+        <p:pic>
+          <p:nvPicPr>
+            <p:cNvPr id="4098" name="Picture 2"/>
+            <p:cNvPicPr>
+              <a:picLocks noChangeAspect="1" noChangeArrowheads="1"/>
+            </p:cNvPicPr>
+            <p:nvPr/>
+          </p:nvPicPr>
+          <p:blipFill>
+            <a:blip r:embed="rId2">
+              <a:extLst>
+                <a:ext uri="{28A0092B-C50C-407E-A947-70E740481C1C}">
+                  <a14:useLocalDpi xmlns:a14="http://schemas.microsoft.com/office/drawing/2010/main" val="0"/>
+                </a:ext>
+              </a:extLst>
+            </a:blip>
+            <a:srcRect/>
+            <a:stretch>
+              <a:fillRect/>
+            </a:stretch>
+          </p:blipFill>
+          <p:spPr bwMode="auto">
+            <a:xfrm>
+              <a:off x="523153" y="1628800"/>
+              <a:ext cx="8097692" cy="4026227"/>
+            </a:xfrm>
+            <a:prstGeom prst="rect">
+              <a:avLst/>
+            </a:prstGeom>
+            <a:noFill/>
+            <a:ln>
+              <a:noFill/>
+            </a:ln>
+            <a:effectLst/>
+            <a:extLst>
+              <a:ext uri="{909E8E84-426E-40DD-AFC4-6F175D3DCCD1}">
+                <a14:hiddenFill xmlns:a14="http://schemas.microsoft.com/office/drawing/2010/main">
+                  <a:solidFill>
+                    <a:schemeClr val="accent1"/>
+                  </a:solidFill>
+                </a14:hiddenFill>
+              </a:ext>
+              <a:ext uri="{91240B29-F687-4F45-9708-019B960494DF}">
+                <a14:hiddenLine xmlns:a14="http://schemas.microsoft.com/office/drawing/2010/main" w="9525">
+                  <a:solidFill>
+                    <a:schemeClr val="tx1"/>
+                  </a:solidFill>
+                  <a:miter lim="800000"/>
+                  <a:headEnd/>
+                  <a:tailEnd/>
+                </a14:hiddenLine>
+              </a:ext>
+              <a:ext uri="{AF507438-7753-43E0-B8FC-AC1667EBCBE1}">
+                <a14:hiddenEffects xmlns:a14="http://schemas.microsoft.com/office/drawing/2010/main">
+                  <a:effectLst>
+                    <a:outerShdw dist="35921" dir="2700000" algn="ctr" rotWithShape="0">
+                      <a:schemeClr val="bg2"/>
+                    </a:outerShdw>
+                  </a:effectLst>
+                </a14:hiddenEffects>
+              </a:ext>
+            </a:extLst>
+          </p:spPr>
+        </p:pic>
+        <p:pic>
+          <p:nvPicPr>
+            <p:cNvPr id="12" name="Picture 3"/>
+            <p:cNvPicPr>
+              <a:picLocks noChangeAspect="1" noChangeArrowheads="1"/>
+            </p:cNvPicPr>
+            <p:nvPr/>
+          </p:nvPicPr>
+          <p:blipFill>
+            <a:blip r:embed="rId3">
+              <a:extLst>
+                <a:ext uri="{28A0092B-C50C-407E-A947-70E740481C1C}">
+                  <a14:useLocalDpi xmlns:a14="http://schemas.microsoft.com/office/drawing/2010/main" val="0"/>
+                </a:ext>
+              </a:extLst>
+            </a:blip>
+            <a:srcRect/>
+            <a:stretch>
+              <a:fillRect/>
+            </a:stretch>
+          </p:blipFill>
+          <p:spPr bwMode="auto">
+            <a:xfrm>
+              <a:off x="3957836" y="4051144"/>
+              <a:ext cx="993454" cy="130331"/>
+            </a:xfrm>
+            <a:prstGeom prst="rect">
+              <a:avLst/>
+            </a:prstGeom>
+            <a:noFill/>
+            <a:ln>
+              <a:noFill/>
+            </a:ln>
+            <a:effectLst/>
+            <a:extLst>
+              <a:ext uri="{909E8E84-426E-40DD-AFC4-6F175D3DCCD1}">
+                <a14:hiddenFill xmlns:a14="http://schemas.microsoft.com/office/drawing/2010/main">
+                  <a:solidFill>
+                    <a:schemeClr val="accent1"/>
+                  </a:solidFill>
+                </a14:hiddenFill>
+              </a:ext>
+              <a:ext uri="{91240B29-F687-4F45-9708-019B960494DF}">
+                <a14:hiddenLine xmlns:a14="http://schemas.microsoft.com/office/drawing/2010/main" w="9525">
+                  <a:solidFill>
+                    <a:schemeClr val="tx1"/>
+                  </a:solidFill>
+                  <a:miter lim="800000"/>
+                  <a:headEnd/>
+                  <a:tailEnd/>
+                </a14:hiddenLine>
+              </a:ext>
+              <a:ext uri="{AF507438-7753-43E0-B8FC-AC1667EBCBE1}">
+                <a14:hiddenEffects xmlns:a14="http://schemas.microsoft.com/office/drawing/2010/main">
+                  <a:effectLst>
+                    <a:outerShdw dist="35921" dir="2700000" algn="ctr" rotWithShape="0">
+                      <a:schemeClr val="bg2"/>
+                    </a:outerShdw>
+                  </a:effectLst>
+                </a14:hiddenEffects>
+              </a:ext>
+            </a:extLst>
+          </p:spPr>
+        </p:pic>
+      </p:grpSp>
     </p:spTree>
     <p:extLst>
       <p:ext uri="{BB962C8B-B14F-4D97-AF65-F5344CB8AC3E}">
@@ -20411,11 +18894,7 @@
           <a:p>
             <a:r>
               <a:rPr lang="bg-BG" dirty="0" smtClean="0"/>
-              <a:t>Състояние на </a:t>
-            </a:r>
-            <a:r>
-              <a:rPr lang="bg-BG" dirty="0" smtClean="0"/>
-              <a:t>работата</a:t>
+              <a:t>Състояние на работата</a:t>
             </a:r>
             <a:br>
               <a:rPr lang="bg-BG" dirty="0" smtClean="0"/>
@@ -20797,7 +19276,6 @@
               <a:rPr lang="bg-BG" dirty="0" smtClean="0"/>
               <a:t>6 седмици?</a:t>
             </a:r>
-            <a:endParaRPr lang="bg-BG" dirty="0" smtClean="0"/>
           </a:p>
         </p:txBody>
       </p:sp>

</xml_diff>